<commit_message>
Added structure for presentation
</commit_message>
<xml_diff>
--- a/1st-presentation/Abrosov-1st-presentation.pptx
+++ b/1st-presentation/Abrosov-1st-presentation.pptx
@@ -6,7 +6,16 @@
   </p:sldMasterIdLst>
   <p:sldIdLst>
     <p:sldId id="256" r:id="rId2"/>
-    <p:sldId id="257" r:id="rId3"/>
+    <p:sldId id="258" r:id="rId3"/>
+    <p:sldId id="257" r:id="rId4"/>
+    <p:sldId id="259" r:id="rId5"/>
+    <p:sldId id="260" r:id="rId6"/>
+    <p:sldId id="261" r:id="rId7"/>
+    <p:sldId id="262" r:id="rId8"/>
+    <p:sldId id="263" r:id="rId9"/>
+    <p:sldId id="264" r:id="rId10"/>
+    <p:sldId id="265" r:id="rId11"/>
+    <p:sldId id="266" r:id="rId12"/>
   </p:sldIdLst>
   <p:sldSz cx="12192000" cy="6858000"/>
   <p:notesSz cx="6858000" cy="9144000"/>
@@ -2985,12 +2994,37 @@
             <p:ph type="ctrTitle"/>
           </p:nvPr>
         </p:nvSpPr>
-        <p:spPr/>
-        <p:txBody>
-          <a:bodyPr/>
-          <a:lstStyle/>
-          <a:p>
-            <a:endParaRPr lang="ru-RU"/>
+        <p:spPr>
+          <a:xfrm>
+            <a:off x="1524000" y="1521756"/>
+            <a:ext cx="9144000" cy="2387600"/>
+          </a:xfrm>
+        </p:spPr>
+        <p:txBody>
+          <a:bodyPr/>
+          <a:lstStyle/>
+          <a:p>
+            <a:r>
+              <a:rPr lang="ru-RU" dirty="0">
+                <a:solidFill>
+                  <a:srgbClr val="FFFF00"/>
+                </a:solidFill>
+              </a:rPr>
+              <a:t>Управление памятью в языке </a:t>
+            </a:r>
+            <a:r>
+              <a:rPr lang="en-US" dirty="0">
+                <a:solidFill>
+                  <a:srgbClr val="FFFF00"/>
+                </a:solidFill>
+              </a:rPr>
+              <a:t>Swift</a:t>
+            </a:r>
+            <a:endParaRPr lang="ru-RU" dirty="0">
+              <a:solidFill>
+                <a:srgbClr val="FFFF00"/>
+              </a:solidFill>
+            </a:endParaRPr>
           </a:p>
         </p:txBody>
       </p:sp>
@@ -3010,12 +3044,22 @@
             <p:ph type="subTitle" idx="1"/>
           </p:nvPr>
         </p:nvSpPr>
-        <p:spPr/>
-        <p:txBody>
-          <a:bodyPr/>
-          <a:lstStyle/>
-          <a:p>
-            <a:endParaRPr lang="ru-RU"/>
+        <p:spPr>
+          <a:xfrm>
+            <a:off x="1524000" y="5202238"/>
+            <a:ext cx="9144000" cy="1655762"/>
+          </a:xfrm>
+        </p:spPr>
+        <p:txBody>
+          <a:bodyPr/>
+          <a:lstStyle/>
+          <a:p>
+            <a:r>
+              <a:rPr lang="ru-RU" dirty="0">
+                <a:latin typeface="+mj-lt"/>
+              </a:rPr>
+              <a:t>Доклад подготовил Абросов Сергей, БПИ202</a:t>
+            </a:r>
           </a:p>
         </p:txBody>
       </p:sp>
@@ -3023,6 +3067,192 @@
     <p:extLst>
       <p:ext uri="{BB962C8B-B14F-4D97-AF65-F5344CB8AC3E}">
         <p14:creationId xmlns:p14="http://schemas.microsoft.com/office/powerpoint/2010/main" val="2960167746"/>
+      </p:ext>
+    </p:extLst>
+  </p:cSld>
+  <p:clrMapOvr>
+    <a:masterClrMapping/>
+  </p:clrMapOvr>
+</p:sld>
+</file>
+
+<file path=ppt/slides/slide10.xml><?xml version="1.0" encoding="utf-8"?>
+<p:sld xmlns:a="http://schemas.openxmlformats.org/drawingml/2006/main" xmlns:r="http://schemas.openxmlformats.org/officeDocument/2006/relationships" xmlns:p="http://schemas.openxmlformats.org/presentationml/2006/main">
+  <p:cSld>
+    <p:spTree>
+      <p:nvGrpSpPr>
+        <p:cNvPr id="1" name=""/>
+        <p:cNvGrpSpPr/>
+        <p:nvPr/>
+      </p:nvGrpSpPr>
+      <p:grpSpPr>
+        <a:xfrm>
+          <a:off x="0" y="0"/>
+          <a:ext cx="0" cy="0"/>
+          <a:chOff x="0" y="0"/>
+          <a:chExt cx="0" cy="0"/>
+        </a:xfrm>
+      </p:grpSpPr>
+      <p:sp>
+        <p:nvSpPr>
+          <p:cNvPr id="2" name="Заголовок 1">
+            <a:extLst>
+              <a:ext uri="{FF2B5EF4-FFF2-40B4-BE49-F238E27FC236}">
+                <a16:creationId xmlns:a16="http://schemas.microsoft.com/office/drawing/2014/main" id="{0EA4CC88-DE7D-FAB0-538E-C477F0DD9593}"/>
+              </a:ext>
+            </a:extLst>
+          </p:cNvPr>
+          <p:cNvSpPr>
+            <a:spLocks noGrp="1"/>
+          </p:cNvSpPr>
+          <p:nvPr>
+            <p:ph type="title"/>
+          </p:nvPr>
+        </p:nvSpPr>
+        <p:spPr/>
+        <p:txBody>
+          <a:bodyPr/>
+          <a:lstStyle/>
+          <a:p>
+            <a:r>
+              <a:rPr lang="en" sz="4400" dirty="0">
+                <a:solidFill>
+                  <a:srgbClr val="FFFF00"/>
+                </a:solidFill>
+                <a:latin typeface="+mj-lt"/>
+              </a:rPr>
+              <a:t>Run Loop</a:t>
+            </a:r>
+            <a:endParaRPr lang="ru-RU" dirty="0">
+              <a:solidFill>
+                <a:srgbClr val="FFFF00"/>
+              </a:solidFill>
+            </a:endParaRPr>
+          </a:p>
+        </p:txBody>
+      </p:sp>
+      <p:sp>
+        <p:nvSpPr>
+          <p:cNvPr id="3" name="Объект 2">
+            <a:extLst>
+              <a:ext uri="{FF2B5EF4-FFF2-40B4-BE49-F238E27FC236}">
+                <a16:creationId xmlns:a16="http://schemas.microsoft.com/office/drawing/2014/main" id="{7492D61D-C0CA-044D-F6A5-A6E525FD639B}"/>
+              </a:ext>
+            </a:extLst>
+          </p:cNvPr>
+          <p:cNvSpPr>
+            <a:spLocks noGrp="1"/>
+          </p:cNvSpPr>
+          <p:nvPr>
+            <p:ph idx="1"/>
+          </p:nvPr>
+        </p:nvSpPr>
+        <p:spPr/>
+        <p:txBody>
+          <a:bodyPr/>
+          <a:lstStyle/>
+          <a:p>
+            <a:endParaRPr lang="ru-RU" dirty="0"/>
+          </a:p>
+        </p:txBody>
+      </p:sp>
+    </p:spTree>
+    <p:extLst>
+      <p:ext uri="{BB962C8B-B14F-4D97-AF65-F5344CB8AC3E}">
+        <p14:creationId xmlns:p14="http://schemas.microsoft.com/office/powerpoint/2010/main" val="3559152448"/>
+      </p:ext>
+    </p:extLst>
+  </p:cSld>
+  <p:clrMapOvr>
+    <a:masterClrMapping/>
+  </p:clrMapOvr>
+</p:sld>
+</file>
+
+<file path=ppt/slides/slide11.xml><?xml version="1.0" encoding="utf-8"?>
+<p:sld xmlns:a="http://schemas.openxmlformats.org/drawingml/2006/main" xmlns:r="http://schemas.openxmlformats.org/officeDocument/2006/relationships" xmlns:p="http://schemas.openxmlformats.org/presentationml/2006/main">
+  <p:cSld>
+    <p:spTree>
+      <p:nvGrpSpPr>
+        <p:cNvPr id="1" name=""/>
+        <p:cNvGrpSpPr/>
+        <p:nvPr/>
+      </p:nvGrpSpPr>
+      <p:grpSpPr>
+        <a:xfrm>
+          <a:off x="0" y="0"/>
+          <a:ext cx="0" cy="0"/>
+          <a:chOff x="0" y="0"/>
+          <a:chExt cx="0" cy="0"/>
+        </a:xfrm>
+      </p:grpSpPr>
+      <p:sp>
+        <p:nvSpPr>
+          <p:cNvPr id="2" name="Заголовок 1">
+            <a:extLst>
+              <a:ext uri="{FF2B5EF4-FFF2-40B4-BE49-F238E27FC236}">
+                <a16:creationId xmlns:a16="http://schemas.microsoft.com/office/drawing/2014/main" id="{2951E1D8-BAC1-5ED4-268C-2AAE2E0171F8}"/>
+              </a:ext>
+            </a:extLst>
+          </p:cNvPr>
+          <p:cNvSpPr>
+            <a:spLocks noGrp="1"/>
+          </p:cNvSpPr>
+          <p:nvPr>
+            <p:ph type="title"/>
+          </p:nvPr>
+        </p:nvSpPr>
+        <p:spPr/>
+        <p:txBody>
+          <a:bodyPr/>
+          <a:lstStyle/>
+          <a:p>
+            <a:r>
+              <a:rPr lang="ru-RU" sz="4400" dirty="0">
+                <a:solidFill>
+                  <a:srgbClr val="FFFF00"/>
+                </a:solidFill>
+                <a:latin typeface="+mj-lt"/>
+              </a:rPr>
+              <a:t>Вопросы с собеседований</a:t>
+            </a:r>
+            <a:endParaRPr lang="ru-RU" dirty="0">
+              <a:solidFill>
+                <a:srgbClr val="FFFF00"/>
+              </a:solidFill>
+            </a:endParaRPr>
+          </a:p>
+        </p:txBody>
+      </p:sp>
+      <p:sp>
+        <p:nvSpPr>
+          <p:cNvPr id="3" name="Объект 2">
+            <a:extLst>
+              <a:ext uri="{FF2B5EF4-FFF2-40B4-BE49-F238E27FC236}">
+                <a16:creationId xmlns:a16="http://schemas.microsoft.com/office/drawing/2014/main" id="{09BA0977-5B01-16A1-BC13-2D0E11803D55}"/>
+              </a:ext>
+            </a:extLst>
+          </p:cNvPr>
+          <p:cNvSpPr>
+            <a:spLocks noGrp="1"/>
+          </p:cNvSpPr>
+          <p:nvPr>
+            <p:ph idx="1"/>
+          </p:nvPr>
+        </p:nvSpPr>
+        <p:spPr/>
+        <p:txBody>
+          <a:bodyPr/>
+          <a:lstStyle/>
+          <a:p>
+            <a:endParaRPr lang="ru-RU"/>
+          </a:p>
+        </p:txBody>
+      </p:sp>
+    </p:spTree>
+    <p:extLst>
+      <p:ext uri="{BB962C8B-B14F-4D97-AF65-F5344CB8AC3E}">
+        <p14:creationId xmlns:p14="http://schemas.microsoft.com/office/powerpoint/2010/main" val="1463931782"/>
       </p:ext>
     </p:extLst>
   </p:cSld>
@@ -3054,7 +3284,7 @@
           <p:cNvPr id="2" name="Заголовок 1">
             <a:extLst>
               <a:ext uri="{FF2B5EF4-FFF2-40B4-BE49-F238E27FC236}">
-                <a16:creationId xmlns:a16="http://schemas.microsoft.com/office/drawing/2014/main" id="{3386C807-D661-D3AF-A853-08E5BC6DE9D0}"/>
+                <a16:creationId xmlns:a16="http://schemas.microsoft.com/office/drawing/2014/main" id="{3F7BB530-A5CE-EFE5-5C45-A2CC9F63BCF9}"/>
               </a:ext>
             </a:extLst>
           </p:cNvPr>
@@ -3070,7 +3300,14 @@
           <a:bodyPr/>
           <a:lstStyle/>
           <a:p>
-            <a:endParaRPr lang="ru-RU"/>
+            <a:r>
+              <a:rPr lang="ru-RU" dirty="0">
+                <a:solidFill>
+                  <a:srgbClr val="FFFF00"/>
+                </a:solidFill>
+              </a:rPr>
+              <a:t>Структура доклада</a:t>
+            </a:r>
           </a:p>
         </p:txBody>
       </p:sp>
@@ -3079,7 +3316,7 @@
           <p:cNvPr id="3" name="Объект 2">
             <a:extLst>
               <a:ext uri="{FF2B5EF4-FFF2-40B4-BE49-F238E27FC236}">
-                <a16:creationId xmlns:a16="http://schemas.microsoft.com/office/drawing/2014/main" id="{AD137A8B-446B-58DD-F477-6526FC585D41}"/>
+                <a16:creationId xmlns:a16="http://schemas.microsoft.com/office/drawing/2014/main" id="{786C9630-5392-2B95-0324-492509C665B3}"/>
               </a:ext>
             </a:extLst>
           </p:cNvPr>
@@ -3092,17 +3329,832 @@
         </p:nvSpPr>
         <p:spPr/>
         <p:txBody>
-          <a:bodyPr/>
-          <a:lstStyle/>
-          <a:p>
-            <a:endParaRPr lang="ru-RU"/>
+          <a:bodyPr>
+            <a:normAutofit lnSpcReduction="10000"/>
+          </a:bodyPr>
+          <a:lstStyle/>
+          <a:p>
+            <a:pPr algn="l" fontAlgn="base">
+              <a:buFont typeface="Arial" panose="020B0604020202020204" pitchFamily="34" charset="0"/>
+              <a:buChar char="•"/>
+            </a:pPr>
+            <a:r>
+              <a:rPr lang="ru-RU" sz="2500" b="0" i="0" u="none" strike="noStrike" dirty="0">
+                <a:effectLst/>
+                <a:latin typeface="+mj-lt"/>
+              </a:rPr>
+              <a:t>Управление памятью в современных языках программирования</a:t>
+            </a:r>
+          </a:p>
+          <a:p>
+            <a:pPr algn="l" fontAlgn="base">
+              <a:buFont typeface="Arial" panose="020B0604020202020204" pitchFamily="34" charset="0"/>
+              <a:buChar char="•"/>
+            </a:pPr>
+            <a:r>
+              <a:rPr lang="en" sz="2500" b="0" i="0" u="none" strike="noStrike" dirty="0">
+                <a:effectLst/>
+                <a:latin typeface="+mj-lt"/>
+              </a:rPr>
+              <a:t>Value</a:t>
+            </a:r>
+            <a:r>
+              <a:rPr lang="en-US" sz="2500" dirty="0">
+                <a:latin typeface="+mj-lt"/>
+              </a:rPr>
+              <a:t>/</a:t>
+            </a:r>
+            <a:r>
+              <a:rPr lang="en" sz="2500" b="0" i="0" u="none" strike="noStrike" dirty="0">
+                <a:effectLst/>
+                <a:latin typeface="+mj-lt"/>
+              </a:rPr>
+              <a:t>Refence types</a:t>
+            </a:r>
+          </a:p>
+          <a:p>
+            <a:pPr algn="l" fontAlgn="base">
+              <a:buFont typeface="Arial" panose="020B0604020202020204" pitchFamily="34" charset="0"/>
+              <a:buChar char="•"/>
+            </a:pPr>
+            <a:r>
+              <a:rPr lang="en" sz="2500" b="0" i="0" u="none" strike="noStrike" dirty="0">
+                <a:effectLst/>
+                <a:latin typeface="+mj-lt"/>
+              </a:rPr>
+              <a:t>MRC</a:t>
+            </a:r>
+          </a:p>
+          <a:p>
+            <a:pPr algn="l" fontAlgn="base">
+              <a:buFont typeface="Arial" panose="020B0604020202020204" pitchFamily="34" charset="0"/>
+              <a:buChar char="•"/>
+            </a:pPr>
+            <a:r>
+              <a:rPr lang="en" sz="2500" b="0" i="0" u="none" strike="noStrike" dirty="0">
+                <a:effectLst/>
+                <a:latin typeface="+mj-lt"/>
+              </a:rPr>
+              <a:t>ARC</a:t>
+            </a:r>
+          </a:p>
+          <a:p>
+            <a:pPr algn="l" fontAlgn="base">
+              <a:buFont typeface="Arial" panose="020B0604020202020204" pitchFamily="34" charset="0"/>
+              <a:buChar char="•"/>
+            </a:pPr>
+            <a:r>
+              <a:rPr lang="en" sz="2500" b="0" i="0" u="none" strike="noStrike" dirty="0">
+                <a:effectLst/>
+                <a:latin typeface="+mj-lt"/>
+              </a:rPr>
+              <a:t>Weak, Strong, Unowned</a:t>
+            </a:r>
+          </a:p>
+          <a:p>
+            <a:pPr algn="l" fontAlgn="base">
+              <a:buFont typeface="Arial" panose="020B0604020202020204" pitchFamily="34" charset="0"/>
+              <a:buChar char="•"/>
+            </a:pPr>
+            <a:r>
+              <a:rPr lang="en" sz="2500" b="0" i="0" u="none" strike="noStrike" dirty="0">
+                <a:effectLst/>
+                <a:latin typeface="+mj-lt"/>
+              </a:rPr>
+              <a:t>Swift Object Lifecycle</a:t>
+            </a:r>
+          </a:p>
+          <a:p>
+            <a:pPr algn="l" fontAlgn="base">
+              <a:buFont typeface="Arial" panose="020B0604020202020204" pitchFamily="34" charset="0"/>
+              <a:buChar char="•"/>
+            </a:pPr>
+            <a:r>
+              <a:rPr lang="en" sz="2500" b="0" i="0" u="none" strike="noStrike" dirty="0" err="1">
+                <a:effectLst/>
+                <a:latin typeface="+mj-lt"/>
+              </a:rPr>
+              <a:t>Autoreleasepool</a:t>
+            </a:r>
+            <a:endParaRPr lang="en" sz="2500" b="0" i="0" u="none" strike="noStrike" dirty="0">
+              <a:effectLst/>
+              <a:latin typeface="+mj-lt"/>
+            </a:endParaRPr>
+          </a:p>
+          <a:p>
+            <a:r>
+              <a:rPr lang="en" sz="2500" dirty="0">
+                <a:latin typeface="+mj-lt"/>
+              </a:rPr>
+              <a:t>Run Loop</a:t>
+            </a:r>
+          </a:p>
+          <a:p>
+            <a:r>
+              <a:rPr lang="ru-RU" sz="2500" dirty="0">
+                <a:latin typeface="+mj-lt"/>
+              </a:rPr>
+              <a:t>Вопросы с собеседований</a:t>
+            </a:r>
+            <a:br>
+              <a:rPr lang="en" sz="2500" dirty="0">
+                <a:latin typeface="+mj-lt"/>
+              </a:rPr>
+            </a:br>
+            <a:endParaRPr lang="ru-RU" sz="2500" dirty="0">
+              <a:latin typeface="+mj-lt"/>
+            </a:endParaRPr>
           </a:p>
         </p:txBody>
       </p:sp>
     </p:spTree>
     <p:extLst>
       <p:ext uri="{BB962C8B-B14F-4D97-AF65-F5344CB8AC3E}">
-        <p14:creationId xmlns:p14="http://schemas.microsoft.com/office/powerpoint/2010/main" val="4001948148"/>
+        <p14:creationId xmlns:p14="http://schemas.microsoft.com/office/powerpoint/2010/main" val="1094373569"/>
+      </p:ext>
+    </p:extLst>
+  </p:cSld>
+  <p:clrMapOvr>
+    <a:masterClrMapping/>
+  </p:clrMapOvr>
+</p:sld>
+</file>
+
+<file path=ppt/slides/slide3.xml><?xml version="1.0" encoding="utf-8"?>
+<p:sld xmlns:a="http://schemas.openxmlformats.org/drawingml/2006/main" xmlns:r="http://schemas.openxmlformats.org/officeDocument/2006/relationships" xmlns:p="http://schemas.openxmlformats.org/presentationml/2006/main">
+  <p:cSld>
+    <p:spTree>
+      <p:nvGrpSpPr>
+        <p:cNvPr id="1" name=""/>
+        <p:cNvGrpSpPr/>
+        <p:nvPr/>
+      </p:nvGrpSpPr>
+      <p:grpSpPr>
+        <a:xfrm>
+          <a:off x="0" y="0"/>
+          <a:ext cx="0" cy="0"/>
+          <a:chOff x="0" y="0"/>
+          <a:chExt cx="0" cy="0"/>
+        </a:xfrm>
+      </p:grpSpPr>
+      <p:sp>
+        <p:nvSpPr>
+          <p:cNvPr id="2" name="Заголовок 1">
+            <a:extLst>
+              <a:ext uri="{FF2B5EF4-FFF2-40B4-BE49-F238E27FC236}">
+                <a16:creationId xmlns:a16="http://schemas.microsoft.com/office/drawing/2014/main" id="{6FF5EB0D-BD4B-D209-53BB-29ACE81D04AB}"/>
+              </a:ext>
+            </a:extLst>
+          </p:cNvPr>
+          <p:cNvSpPr>
+            <a:spLocks noGrp="1"/>
+          </p:cNvSpPr>
+          <p:nvPr>
+            <p:ph type="title"/>
+          </p:nvPr>
+        </p:nvSpPr>
+        <p:spPr/>
+        <p:txBody>
+          <a:bodyPr/>
+          <a:lstStyle/>
+          <a:p>
+            <a:r>
+              <a:rPr lang="ru-RU" dirty="0">
+                <a:solidFill>
+                  <a:srgbClr val="FFFF00"/>
+                </a:solidFill>
+              </a:rPr>
+              <a:t>Управление памятью в современных ЯП</a:t>
+            </a:r>
+          </a:p>
+        </p:txBody>
+      </p:sp>
+      <p:sp>
+        <p:nvSpPr>
+          <p:cNvPr id="3" name="Объект 2">
+            <a:extLst>
+              <a:ext uri="{FF2B5EF4-FFF2-40B4-BE49-F238E27FC236}">
+                <a16:creationId xmlns:a16="http://schemas.microsoft.com/office/drawing/2014/main" id="{B609F2BD-30CD-6C15-FED6-F0E01845923D}"/>
+              </a:ext>
+            </a:extLst>
+          </p:cNvPr>
+          <p:cNvSpPr>
+            <a:spLocks noGrp="1"/>
+          </p:cNvSpPr>
+          <p:nvPr>
+            <p:ph idx="1"/>
+          </p:nvPr>
+        </p:nvSpPr>
+        <p:spPr/>
+        <p:txBody>
+          <a:bodyPr>
+            <a:normAutofit/>
+          </a:bodyPr>
+          <a:lstStyle/>
+          <a:p>
+            <a:r>
+              <a:rPr lang="ru-RU" sz="1500" dirty="0">
+                <a:latin typeface="+mj-lt"/>
+              </a:rPr>
+              <a:t>Управление памятью — является важной даже в современных технологиях</a:t>
+            </a:r>
+            <a:r>
+              <a:rPr lang="ru-RU" sz="1500">
+                <a:latin typeface="+mj-lt"/>
+              </a:rPr>
+              <a:t>. </a:t>
+            </a:r>
+          </a:p>
+          <a:p>
+            <a:r>
+              <a:rPr lang="ru-RU" sz="1500">
+                <a:latin typeface="+mj-lt"/>
+              </a:rPr>
+              <a:t>Неправильное </a:t>
+            </a:r>
+            <a:r>
+              <a:rPr lang="ru-RU" sz="1500" dirty="0">
+                <a:latin typeface="+mj-lt"/>
+              </a:rPr>
+              <a:t>использование может привести к долгой загрузке, </a:t>
+            </a:r>
+            <a:r>
+              <a:rPr lang="ru-RU" sz="1500" dirty="0" err="1">
+                <a:latin typeface="+mj-lt"/>
+              </a:rPr>
+              <a:t>крашам</a:t>
+            </a:r>
+            <a:r>
+              <a:rPr lang="ru-RU" sz="1500" dirty="0">
+                <a:latin typeface="+mj-lt"/>
+              </a:rPr>
+              <a:t> приложения. </a:t>
+            </a:r>
+          </a:p>
+        </p:txBody>
+      </p:sp>
+    </p:spTree>
+    <p:extLst>
+      <p:ext uri="{BB962C8B-B14F-4D97-AF65-F5344CB8AC3E}">
+        <p14:creationId xmlns:p14="http://schemas.microsoft.com/office/powerpoint/2010/main" val="1527358738"/>
+      </p:ext>
+    </p:extLst>
+  </p:cSld>
+  <p:clrMapOvr>
+    <a:masterClrMapping/>
+  </p:clrMapOvr>
+</p:sld>
+</file>
+
+<file path=ppt/slides/slide4.xml><?xml version="1.0" encoding="utf-8"?>
+<p:sld xmlns:a="http://schemas.openxmlformats.org/drawingml/2006/main" xmlns:r="http://schemas.openxmlformats.org/officeDocument/2006/relationships" xmlns:p="http://schemas.openxmlformats.org/presentationml/2006/main">
+  <p:cSld>
+    <p:spTree>
+      <p:nvGrpSpPr>
+        <p:cNvPr id="1" name=""/>
+        <p:cNvGrpSpPr/>
+        <p:nvPr/>
+      </p:nvGrpSpPr>
+      <p:grpSpPr>
+        <a:xfrm>
+          <a:off x="0" y="0"/>
+          <a:ext cx="0" cy="0"/>
+          <a:chOff x="0" y="0"/>
+          <a:chExt cx="0" cy="0"/>
+        </a:xfrm>
+      </p:grpSpPr>
+      <p:sp>
+        <p:nvSpPr>
+          <p:cNvPr id="2" name="Заголовок 1">
+            <a:extLst>
+              <a:ext uri="{FF2B5EF4-FFF2-40B4-BE49-F238E27FC236}">
+                <a16:creationId xmlns:a16="http://schemas.microsoft.com/office/drawing/2014/main" id="{F1767101-7A03-66B6-794C-66CA9DC3475F}"/>
+              </a:ext>
+            </a:extLst>
+          </p:cNvPr>
+          <p:cNvSpPr>
+            <a:spLocks noGrp="1"/>
+          </p:cNvSpPr>
+          <p:nvPr>
+            <p:ph type="title"/>
+          </p:nvPr>
+        </p:nvSpPr>
+        <p:spPr/>
+        <p:txBody>
+          <a:bodyPr/>
+          <a:lstStyle/>
+          <a:p>
+            <a:r>
+              <a:rPr lang="en-US" dirty="0">
+                <a:solidFill>
+                  <a:srgbClr val="FFFF00"/>
+                </a:solidFill>
+              </a:rPr>
+              <a:t>Value/Reference types</a:t>
+            </a:r>
+            <a:endParaRPr lang="ru-RU" dirty="0">
+              <a:solidFill>
+                <a:srgbClr val="FFFF00"/>
+              </a:solidFill>
+            </a:endParaRPr>
+          </a:p>
+        </p:txBody>
+      </p:sp>
+      <p:sp>
+        <p:nvSpPr>
+          <p:cNvPr id="3" name="Объект 2">
+            <a:extLst>
+              <a:ext uri="{FF2B5EF4-FFF2-40B4-BE49-F238E27FC236}">
+                <a16:creationId xmlns:a16="http://schemas.microsoft.com/office/drawing/2014/main" id="{863C2EB8-9081-A36C-99EB-3392D4456F9E}"/>
+              </a:ext>
+            </a:extLst>
+          </p:cNvPr>
+          <p:cNvSpPr>
+            <a:spLocks noGrp="1"/>
+          </p:cNvSpPr>
+          <p:nvPr>
+            <p:ph idx="1"/>
+          </p:nvPr>
+        </p:nvSpPr>
+        <p:spPr/>
+        <p:txBody>
+          <a:bodyPr/>
+          <a:lstStyle/>
+          <a:p>
+            <a:endParaRPr lang="ru-RU" dirty="0"/>
+          </a:p>
+        </p:txBody>
+      </p:sp>
+    </p:spTree>
+    <p:extLst>
+      <p:ext uri="{BB962C8B-B14F-4D97-AF65-F5344CB8AC3E}">
+        <p14:creationId xmlns:p14="http://schemas.microsoft.com/office/powerpoint/2010/main" val="2660883994"/>
+      </p:ext>
+    </p:extLst>
+  </p:cSld>
+  <p:clrMapOvr>
+    <a:masterClrMapping/>
+  </p:clrMapOvr>
+</p:sld>
+</file>
+
+<file path=ppt/slides/slide5.xml><?xml version="1.0" encoding="utf-8"?>
+<p:sld xmlns:a="http://schemas.openxmlformats.org/drawingml/2006/main" xmlns:r="http://schemas.openxmlformats.org/officeDocument/2006/relationships" xmlns:p="http://schemas.openxmlformats.org/presentationml/2006/main">
+  <p:cSld>
+    <p:spTree>
+      <p:nvGrpSpPr>
+        <p:cNvPr id="1" name=""/>
+        <p:cNvGrpSpPr/>
+        <p:nvPr/>
+      </p:nvGrpSpPr>
+      <p:grpSpPr>
+        <a:xfrm>
+          <a:off x="0" y="0"/>
+          <a:ext cx="0" cy="0"/>
+          <a:chOff x="0" y="0"/>
+          <a:chExt cx="0" cy="0"/>
+        </a:xfrm>
+      </p:grpSpPr>
+      <p:sp>
+        <p:nvSpPr>
+          <p:cNvPr id="2" name="Заголовок 1">
+            <a:extLst>
+              <a:ext uri="{FF2B5EF4-FFF2-40B4-BE49-F238E27FC236}">
+                <a16:creationId xmlns:a16="http://schemas.microsoft.com/office/drawing/2014/main" id="{12B45902-42EB-BD5C-45F3-8466D644BAC5}"/>
+              </a:ext>
+            </a:extLst>
+          </p:cNvPr>
+          <p:cNvSpPr>
+            <a:spLocks noGrp="1"/>
+          </p:cNvSpPr>
+          <p:nvPr>
+            <p:ph type="title"/>
+          </p:nvPr>
+        </p:nvSpPr>
+        <p:spPr/>
+        <p:txBody>
+          <a:bodyPr/>
+          <a:lstStyle/>
+          <a:p>
+            <a:r>
+              <a:rPr lang="en-US" dirty="0">
+                <a:solidFill>
+                  <a:srgbClr val="FFFF00"/>
+                </a:solidFill>
+              </a:rPr>
+              <a:t>MRC</a:t>
+            </a:r>
+            <a:endParaRPr lang="ru-RU" dirty="0">
+              <a:solidFill>
+                <a:srgbClr val="FFFF00"/>
+              </a:solidFill>
+            </a:endParaRPr>
+          </a:p>
+        </p:txBody>
+      </p:sp>
+      <p:sp>
+        <p:nvSpPr>
+          <p:cNvPr id="3" name="Объект 2">
+            <a:extLst>
+              <a:ext uri="{FF2B5EF4-FFF2-40B4-BE49-F238E27FC236}">
+                <a16:creationId xmlns:a16="http://schemas.microsoft.com/office/drawing/2014/main" id="{388D3471-DB3F-4D30-BFC6-AA19B72AD206}"/>
+              </a:ext>
+            </a:extLst>
+          </p:cNvPr>
+          <p:cNvSpPr>
+            <a:spLocks noGrp="1"/>
+          </p:cNvSpPr>
+          <p:nvPr>
+            <p:ph idx="1"/>
+          </p:nvPr>
+        </p:nvSpPr>
+        <p:spPr/>
+        <p:txBody>
+          <a:bodyPr/>
+          <a:lstStyle/>
+          <a:p>
+            <a:endParaRPr lang="ru-RU"/>
+          </a:p>
+        </p:txBody>
+      </p:sp>
+    </p:spTree>
+    <p:extLst>
+      <p:ext uri="{BB962C8B-B14F-4D97-AF65-F5344CB8AC3E}">
+        <p14:creationId xmlns:p14="http://schemas.microsoft.com/office/powerpoint/2010/main" val="51319313"/>
+      </p:ext>
+    </p:extLst>
+  </p:cSld>
+  <p:clrMapOvr>
+    <a:masterClrMapping/>
+  </p:clrMapOvr>
+</p:sld>
+</file>
+
+<file path=ppt/slides/slide6.xml><?xml version="1.0" encoding="utf-8"?>
+<p:sld xmlns:a="http://schemas.openxmlformats.org/drawingml/2006/main" xmlns:r="http://schemas.openxmlformats.org/officeDocument/2006/relationships" xmlns:p="http://schemas.openxmlformats.org/presentationml/2006/main">
+  <p:cSld>
+    <p:spTree>
+      <p:nvGrpSpPr>
+        <p:cNvPr id="1" name=""/>
+        <p:cNvGrpSpPr/>
+        <p:nvPr/>
+      </p:nvGrpSpPr>
+      <p:grpSpPr>
+        <a:xfrm>
+          <a:off x="0" y="0"/>
+          <a:ext cx="0" cy="0"/>
+          <a:chOff x="0" y="0"/>
+          <a:chExt cx="0" cy="0"/>
+        </a:xfrm>
+      </p:grpSpPr>
+      <p:sp>
+        <p:nvSpPr>
+          <p:cNvPr id="2" name="Заголовок 1">
+            <a:extLst>
+              <a:ext uri="{FF2B5EF4-FFF2-40B4-BE49-F238E27FC236}">
+                <a16:creationId xmlns:a16="http://schemas.microsoft.com/office/drawing/2014/main" id="{05486D93-840D-8B3F-3089-413EBEAD7082}"/>
+              </a:ext>
+            </a:extLst>
+          </p:cNvPr>
+          <p:cNvSpPr>
+            <a:spLocks noGrp="1"/>
+          </p:cNvSpPr>
+          <p:nvPr>
+            <p:ph type="title"/>
+          </p:nvPr>
+        </p:nvSpPr>
+        <p:spPr/>
+        <p:txBody>
+          <a:bodyPr/>
+          <a:lstStyle/>
+          <a:p>
+            <a:r>
+              <a:rPr lang="en-US" dirty="0">
+                <a:solidFill>
+                  <a:srgbClr val="FFFF00"/>
+                </a:solidFill>
+              </a:rPr>
+              <a:t>ARC</a:t>
+            </a:r>
+            <a:endParaRPr lang="ru-RU" dirty="0">
+              <a:solidFill>
+                <a:srgbClr val="FFFF00"/>
+              </a:solidFill>
+            </a:endParaRPr>
+          </a:p>
+        </p:txBody>
+      </p:sp>
+      <p:sp>
+        <p:nvSpPr>
+          <p:cNvPr id="3" name="Объект 2">
+            <a:extLst>
+              <a:ext uri="{FF2B5EF4-FFF2-40B4-BE49-F238E27FC236}">
+                <a16:creationId xmlns:a16="http://schemas.microsoft.com/office/drawing/2014/main" id="{19FAC263-B8E4-5670-E1AE-6B78B62A721E}"/>
+              </a:ext>
+            </a:extLst>
+          </p:cNvPr>
+          <p:cNvSpPr>
+            <a:spLocks noGrp="1"/>
+          </p:cNvSpPr>
+          <p:nvPr>
+            <p:ph idx="1"/>
+          </p:nvPr>
+        </p:nvSpPr>
+        <p:spPr/>
+        <p:txBody>
+          <a:bodyPr/>
+          <a:lstStyle/>
+          <a:p>
+            <a:endParaRPr lang="ru-RU"/>
+          </a:p>
+        </p:txBody>
+      </p:sp>
+    </p:spTree>
+    <p:extLst>
+      <p:ext uri="{BB962C8B-B14F-4D97-AF65-F5344CB8AC3E}">
+        <p14:creationId xmlns:p14="http://schemas.microsoft.com/office/powerpoint/2010/main" val="3195558694"/>
+      </p:ext>
+    </p:extLst>
+  </p:cSld>
+  <p:clrMapOvr>
+    <a:masterClrMapping/>
+  </p:clrMapOvr>
+</p:sld>
+</file>
+
+<file path=ppt/slides/slide7.xml><?xml version="1.0" encoding="utf-8"?>
+<p:sld xmlns:a="http://schemas.openxmlformats.org/drawingml/2006/main" xmlns:r="http://schemas.openxmlformats.org/officeDocument/2006/relationships" xmlns:p="http://schemas.openxmlformats.org/presentationml/2006/main">
+  <p:cSld>
+    <p:spTree>
+      <p:nvGrpSpPr>
+        <p:cNvPr id="1" name=""/>
+        <p:cNvGrpSpPr/>
+        <p:nvPr/>
+      </p:nvGrpSpPr>
+      <p:grpSpPr>
+        <a:xfrm>
+          <a:off x="0" y="0"/>
+          <a:ext cx="0" cy="0"/>
+          <a:chOff x="0" y="0"/>
+          <a:chExt cx="0" cy="0"/>
+        </a:xfrm>
+      </p:grpSpPr>
+      <p:sp>
+        <p:nvSpPr>
+          <p:cNvPr id="2" name="Заголовок 1">
+            <a:extLst>
+              <a:ext uri="{FF2B5EF4-FFF2-40B4-BE49-F238E27FC236}">
+                <a16:creationId xmlns:a16="http://schemas.microsoft.com/office/drawing/2014/main" id="{CE3DFBBE-1258-16F5-7626-4B53EFC6C005}"/>
+              </a:ext>
+            </a:extLst>
+          </p:cNvPr>
+          <p:cNvSpPr>
+            <a:spLocks noGrp="1"/>
+          </p:cNvSpPr>
+          <p:nvPr>
+            <p:ph type="title"/>
+          </p:nvPr>
+        </p:nvSpPr>
+        <p:spPr/>
+        <p:txBody>
+          <a:bodyPr/>
+          <a:lstStyle/>
+          <a:p>
+            <a:r>
+              <a:rPr lang="en" sz="4400" b="0" i="0" u="none" strike="noStrike" dirty="0">
+                <a:solidFill>
+                  <a:srgbClr val="FFFF00"/>
+                </a:solidFill>
+                <a:effectLst/>
+                <a:latin typeface="+mj-lt"/>
+              </a:rPr>
+              <a:t>Weak, Strong, Unowned</a:t>
+            </a:r>
+            <a:endParaRPr lang="ru-RU" dirty="0">
+              <a:solidFill>
+                <a:srgbClr val="FFFF00"/>
+              </a:solidFill>
+            </a:endParaRPr>
+          </a:p>
+        </p:txBody>
+      </p:sp>
+      <p:sp>
+        <p:nvSpPr>
+          <p:cNvPr id="3" name="Объект 2">
+            <a:extLst>
+              <a:ext uri="{FF2B5EF4-FFF2-40B4-BE49-F238E27FC236}">
+                <a16:creationId xmlns:a16="http://schemas.microsoft.com/office/drawing/2014/main" id="{67F42960-E25D-9581-2755-04035EE0E74F}"/>
+              </a:ext>
+            </a:extLst>
+          </p:cNvPr>
+          <p:cNvSpPr>
+            <a:spLocks noGrp="1"/>
+          </p:cNvSpPr>
+          <p:nvPr>
+            <p:ph idx="1"/>
+          </p:nvPr>
+        </p:nvSpPr>
+        <p:spPr/>
+        <p:txBody>
+          <a:bodyPr/>
+          <a:lstStyle/>
+          <a:p>
+            <a:endParaRPr lang="ru-RU"/>
+          </a:p>
+        </p:txBody>
+      </p:sp>
+    </p:spTree>
+    <p:extLst>
+      <p:ext uri="{BB962C8B-B14F-4D97-AF65-F5344CB8AC3E}">
+        <p14:creationId xmlns:p14="http://schemas.microsoft.com/office/powerpoint/2010/main" val="1821829135"/>
+      </p:ext>
+    </p:extLst>
+  </p:cSld>
+  <p:clrMapOvr>
+    <a:masterClrMapping/>
+  </p:clrMapOvr>
+</p:sld>
+</file>
+
+<file path=ppt/slides/slide8.xml><?xml version="1.0" encoding="utf-8"?>
+<p:sld xmlns:a="http://schemas.openxmlformats.org/drawingml/2006/main" xmlns:r="http://schemas.openxmlformats.org/officeDocument/2006/relationships" xmlns:p="http://schemas.openxmlformats.org/presentationml/2006/main">
+  <p:cSld>
+    <p:spTree>
+      <p:nvGrpSpPr>
+        <p:cNvPr id="1" name=""/>
+        <p:cNvGrpSpPr/>
+        <p:nvPr/>
+      </p:nvGrpSpPr>
+      <p:grpSpPr>
+        <a:xfrm>
+          <a:off x="0" y="0"/>
+          <a:ext cx="0" cy="0"/>
+          <a:chOff x="0" y="0"/>
+          <a:chExt cx="0" cy="0"/>
+        </a:xfrm>
+      </p:grpSpPr>
+      <p:sp>
+        <p:nvSpPr>
+          <p:cNvPr id="2" name="Заголовок 1">
+            <a:extLst>
+              <a:ext uri="{FF2B5EF4-FFF2-40B4-BE49-F238E27FC236}">
+                <a16:creationId xmlns:a16="http://schemas.microsoft.com/office/drawing/2014/main" id="{F5E9D4A7-63AE-768B-E967-B61C4BF93EED}"/>
+              </a:ext>
+            </a:extLst>
+          </p:cNvPr>
+          <p:cNvSpPr>
+            <a:spLocks noGrp="1"/>
+          </p:cNvSpPr>
+          <p:nvPr>
+            <p:ph type="title"/>
+          </p:nvPr>
+        </p:nvSpPr>
+        <p:spPr/>
+        <p:txBody>
+          <a:bodyPr/>
+          <a:lstStyle/>
+          <a:p>
+            <a:r>
+              <a:rPr lang="en" sz="4400" b="0" i="0" u="none" strike="noStrike" dirty="0">
+                <a:solidFill>
+                  <a:srgbClr val="FFFF00"/>
+                </a:solidFill>
+                <a:effectLst/>
+                <a:latin typeface="+mj-lt"/>
+              </a:rPr>
+              <a:t>Swift Object Lifecycle</a:t>
+            </a:r>
+            <a:endParaRPr lang="ru-RU" dirty="0">
+              <a:solidFill>
+                <a:srgbClr val="FFFF00"/>
+              </a:solidFill>
+            </a:endParaRPr>
+          </a:p>
+        </p:txBody>
+      </p:sp>
+      <p:sp>
+        <p:nvSpPr>
+          <p:cNvPr id="3" name="Объект 2">
+            <a:extLst>
+              <a:ext uri="{FF2B5EF4-FFF2-40B4-BE49-F238E27FC236}">
+                <a16:creationId xmlns:a16="http://schemas.microsoft.com/office/drawing/2014/main" id="{A46B9563-6FD4-C902-6EB5-7969E07F2C9C}"/>
+              </a:ext>
+            </a:extLst>
+          </p:cNvPr>
+          <p:cNvSpPr>
+            <a:spLocks noGrp="1"/>
+          </p:cNvSpPr>
+          <p:nvPr>
+            <p:ph idx="1"/>
+          </p:nvPr>
+        </p:nvSpPr>
+        <p:spPr/>
+        <p:txBody>
+          <a:bodyPr/>
+          <a:lstStyle/>
+          <a:p>
+            <a:endParaRPr lang="ru-RU"/>
+          </a:p>
+        </p:txBody>
+      </p:sp>
+    </p:spTree>
+    <p:extLst>
+      <p:ext uri="{BB962C8B-B14F-4D97-AF65-F5344CB8AC3E}">
+        <p14:creationId xmlns:p14="http://schemas.microsoft.com/office/powerpoint/2010/main" val="375712703"/>
+      </p:ext>
+    </p:extLst>
+  </p:cSld>
+  <p:clrMapOvr>
+    <a:masterClrMapping/>
+  </p:clrMapOvr>
+</p:sld>
+</file>
+
+<file path=ppt/slides/slide9.xml><?xml version="1.0" encoding="utf-8"?>
+<p:sld xmlns:a="http://schemas.openxmlformats.org/drawingml/2006/main" xmlns:r="http://schemas.openxmlformats.org/officeDocument/2006/relationships" xmlns:p="http://schemas.openxmlformats.org/presentationml/2006/main">
+  <p:cSld>
+    <p:spTree>
+      <p:nvGrpSpPr>
+        <p:cNvPr id="1" name=""/>
+        <p:cNvGrpSpPr/>
+        <p:nvPr/>
+      </p:nvGrpSpPr>
+      <p:grpSpPr>
+        <a:xfrm>
+          <a:off x="0" y="0"/>
+          <a:ext cx="0" cy="0"/>
+          <a:chOff x="0" y="0"/>
+          <a:chExt cx="0" cy="0"/>
+        </a:xfrm>
+      </p:grpSpPr>
+      <p:sp>
+        <p:nvSpPr>
+          <p:cNvPr id="2" name="Заголовок 1">
+            <a:extLst>
+              <a:ext uri="{FF2B5EF4-FFF2-40B4-BE49-F238E27FC236}">
+                <a16:creationId xmlns:a16="http://schemas.microsoft.com/office/drawing/2014/main" id="{8143DB06-FF76-D5EF-190C-D602489B68FA}"/>
+              </a:ext>
+            </a:extLst>
+          </p:cNvPr>
+          <p:cNvSpPr>
+            <a:spLocks noGrp="1"/>
+          </p:cNvSpPr>
+          <p:nvPr>
+            <p:ph type="title"/>
+          </p:nvPr>
+        </p:nvSpPr>
+        <p:spPr/>
+        <p:txBody>
+          <a:bodyPr/>
+          <a:lstStyle/>
+          <a:p>
+            <a:r>
+              <a:rPr lang="en" sz="4400" b="0" i="0" u="none" strike="noStrike" dirty="0" err="1">
+                <a:solidFill>
+                  <a:srgbClr val="FFFF00"/>
+                </a:solidFill>
+                <a:effectLst/>
+                <a:latin typeface="+mj-lt"/>
+              </a:rPr>
+              <a:t>Autoreleasepool</a:t>
+            </a:r>
+            <a:endParaRPr lang="ru-RU" dirty="0">
+              <a:solidFill>
+                <a:srgbClr val="FFFF00"/>
+              </a:solidFill>
+            </a:endParaRPr>
+          </a:p>
+        </p:txBody>
+      </p:sp>
+      <p:sp>
+        <p:nvSpPr>
+          <p:cNvPr id="3" name="Объект 2">
+            <a:extLst>
+              <a:ext uri="{FF2B5EF4-FFF2-40B4-BE49-F238E27FC236}">
+                <a16:creationId xmlns:a16="http://schemas.microsoft.com/office/drawing/2014/main" id="{00E6139E-DC44-1D2A-58F1-FD53E2EA434C}"/>
+              </a:ext>
+            </a:extLst>
+          </p:cNvPr>
+          <p:cNvSpPr>
+            <a:spLocks noGrp="1"/>
+          </p:cNvSpPr>
+          <p:nvPr>
+            <p:ph idx="1"/>
+          </p:nvPr>
+        </p:nvSpPr>
+        <p:spPr/>
+        <p:txBody>
+          <a:bodyPr/>
+          <a:lstStyle/>
+          <a:p>
+            <a:endParaRPr lang="ru-RU"/>
+          </a:p>
+        </p:txBody>
+      </p:sp>
+    </p:spTree>
+    <p:extLst>
+      <p:ext uri="{BB962C8B-B14F-4D97-AF65-F5344CB8AC3E}">
+        <p14:creationId xmlns:p14="http://schemas.microsoft.com/office/powerpoint/2010/main" val="3200227656"/>
       </p:ext>
     </p:extLst>
   </p:cSld>

</xml_diff>

<commit_message>
Added first point and two quastions
</commit_message>
<xml_diff>
--- a/1st-presentation/Abrosov-1st-presentation.pptx
+++ b/1st-presentation/Abrosov-1st-presentation.pptx
@@ -8,14 +8,22 @@
     <p:sldId id="256" r:id="rId2"/>
     <p:sldId id="258" r:id="rId3"/>
     <p:sldId id="257" r:id="rId4"/>
-    <p:sldId id="259" r:id="rId5"/>
-    <p:sldId id="260" r:id="rId6"/>
-    <p:sldId id="261" r:id="rId7"/>
-    <p:sldId id="262" r:id="rId8"/>
-    <p:sldId id="263" r:id="rId9"/>
-    <p:sldId id="264" r:id="rId10"/>
-    <p:sldId id="265" r:id="rId11"/>
-    <p:sldId id="266" r:id="rId12"/>
+    <p:sldId id="267" r:id="rId5"/>
+    <p:sldId id="268" r:id="rId6"/>
+    <p:sldId id="269" r:id="rId7"/>
+    <p:sldId id="271" r:id="rId8"/>
+    <p:sldId id="272" r:id="rId9"/>
+    <p:sldId id="270" r:id="rId10"/>
+    <p:sldId id="259" r:id="rId11"/>
+    <p:sldId id="260" r:id="rId12"/>
+    <p:sldId id="261" r:id="rId13"/>
+    <p:sldId id="262" r:id="rId14"/>
+    <p:sldId id="263" r:id="rId15"/>
+    <p:sldId id="265" r:id="rId16"/>
+    <p:sldId id="264" r:id="rId17"/>
+    <p:sldId id="266" r:id="rId18"/>
+    <p:sldId id="273" r:id="rId19"/>
+    <p:sldId id="274" r:id="rId20"/>
   </p:sldIdLst>
   <p:sldSz cx="12192000" cy="6858000"/>
   <p:notesSz cx="6858000" cy="9144000"/>
@@ -3098,7 +3106,7 @@
           <p:cNvPr id="2" name="Заголовок 1">
             <a:extLst>
               <a:ext uri="{FF2B5EF4-FFF2-40B4-BE49-F238E27FC236}">
-                <a16:creationId xmlns:a16="http://schemas.microsoft.com/office/drawing/2014/main" id="{0EA4CC88-DE7D-FAB0-538E-C477F0DD9593}"/>
+                <a16:creationId xmlns:a16="http://schemas.microsoft.com/office/drawing/2014/main" id="{F1767101-7A03-66B6-794C-66CA9DC3475F}"/>
               </a:ext>
             </a:extLst>
           </p:cNvPr>
@@ -3115,13 +3123,12 @@
           <a:lstStyle/>
           <a:p>
             <a:r>
-              <a:rPr lang="en" sz="4400" dirty="0">
+              <a:rPr lang="en-US" dirty="0">
                 <a:solidFill>
                   <a:srgbClr val="FFFF00"/>
                 </a:solidFill>
-                <a:latin typeface="+mj-lt"/>
-              </a:rPr>
-              <a:t>Run Loop</a:t>
+              </a:rPr>
+              <a:t>Value/Reference types</a:t>
             </a:r>
             <a:endParaRPr lang="ru-RU" dirty="0">
               <a:solidFill>
@@ -3136,7 +3143,7 @@
           <p:cNvPr id="3" name="Объект 2">
             <a:extLst>
               <a:ext uri="{FF2B5EF4-FFF2-40B4-BE49-F238E27FC236}">
-                <a16:creationId xmlns:a16="http://schemas.microsoft.com/office/drawing/2014/main" id="{7492D61D-C0CA-044D-F6A5-A6E525FD639B}"/>
+                <a16:creationId xmlns:a16="http://schemas.microsoft.com/office/drawing/2014/main" id="{863C2EB8-9081-A36C-99EB-3392D4456F9E}"/>
               </a:ext>
             </a:extLst>
           </p:cNvPr>
@@ -3159,7 +3166,7 @@
     </p:spTree>
     <p:extLst>
       <p:ext uri="{BB962C8B-B14F-4D97-AF65-F5344CB8AC3E}">
-        <p14:creationId xmlns:p14="http://schemas.microsoft.com/office/powerpoint/2010/main" val="3559152448"/>
+        <p14:creationId xmlns:p14="http://schemas.microsoft.com/office/powerpoint/2010/main" val="2660883994"/>
       </p:ext>
     </p:extLst>
   </p:cSld>
@@ -3191,6 +3198,565 @@
           <p:cNvPr id="2" name="Заголовок 1">
             <a:extLst>
               <a:ext uri="{FF2B5EF4-FFF2-40B4-BE49-F238E27FC236}">
+                <a16:creationId xmlns:a16="http://schemas.microsoft.com/office/drawing/2014/main" id="{12B45902-42EB-BD5C-45F3-8466D644BAC5}"/>
+              </a:ext>
+            </a:extLst>
+          </p:cNvPr>
+          <p:cNvSpPr>
+            <a:spLocks noGrp="1"/>
+          </p:cNvSpPr>
+          <p:nvPr>
+            <p:ph type="title"/>
+          </p:nvPr>
+        </p:nvSpPr>
+        <p:spPr/>
+        <p:txBody>
+          <a:bodyPr/>
+          <a:lstStyle/>
+          <a:p>
+            <a:r>
+              <a:rPr lang="en-US" dirty="0">
+                <a:solidFill>
+                  <a:srgbClr val="FFFF00"/>
+                </a:solidFill>
+              </a:rPr>
+              <a:t>MRC</a:t>
+            </a:r>
+            <a:endParaRPr lang="ru-RU" dirty="0">
+              <a:solidFill>
+                <a:srgbClr val="FFFF00"/>
+              </a:solidFill>
+            </a:endParaRPr>
+          </a:p>
+        </p:txBody>
+      </p:sp>
+      <p:sp>
+        <p:nvSpPr>
+          <p:cNvPr id="3" name="Объект 2">
+            <a:extLst>
+              <a:ext uri="{FF2B5EF4-FFF2-40B4-BE49-F238E27FC236}">
+                <a16:creationId xmlns:a16="http://schemas.microsoft.com/office/drawing/2014/main" id="{388D3471-DB3F-4D30-BFC6-AA19B72AD206}"/>
+              </a:ext>
+            </a:extLst>
+          </p:cNvPr>
+          <p:cNvSpPr>
+            <a:spLocks noGrp="1"/>
+          </p:cNvSpPr>
+          <p:nvPr>
+            <p:ph idx="1"/>
+          </p:nvPr>
+        </p:nvSpPr>
+        <p:spPr/>
+        <p:txBody>
+          <a:bodyPr/>
+          <a:lstStyle/>
+          <a:p>
+            <a:endParaRPr lang="ru-RU"/>
+          </a:p>
+        </p:txBody>
+      </p:sp>
+    </p:spTree>
+    <p:extLst>
+      <p:ext uri="{BB962C8B-B14F-4D97-AF65-F5344CB8AC3E}">
+        <p14:creationId xmlns:p14="http://schemas.microsoft.com/office/powerpoint/2010/main" val="51319313"/>
+      </p:ext>
+    </p:extLst>
+  </p:cSld>
+  <p:clrMapOvr>
+    <a:masterClrMapping/>
+  </p:clrMapOvr>
+</p:sld>
+</file>
+
+<file path=ppt/slides/slide12.xml><?xml version="1.0" encoding="utf-8"?>
+<p:sld xmlns:a="http://schemas.openxmlformats.org/drawingml/2006/main" xmlns:r="http://schemas.openxmlformats.org/officeDocument/2006/relationships" xmlns:p="http://schemas.openxmlformats.org/presentationml/2006/main">
+  <p:cSld>
+    <p:spTree>
+      <p:nvGrpSpPr>
+        <p:cNvPr id="1" name=""/>
+        <p:cNvGrpSpPr/>
+        <p:nvPr/>
+      </p:nvGrpSpPr>
+      <p:grpSpPr>
+        <a:xfrm>
+          <a:off x="0" y="0"/>
+          <a:ext cx="0" cy="0"/>
+          <a:chOff x="0" y="0"/>
+          <a:chExt cx="0" cy="0"/>
+        </a:xfrm>
+      </p:grpSpPr>
+      <p:sp>
+        <p:nvSpPr>
+          <p:cNvPr id="2" name="Заголовок 1">
+            <a:extLst>
+              <a:ext uri="{FF2B5EF4-FFF2-40B4-BE49-F238E27FC236}">
+                <a16:creationId xmlns:a16="http://schemas.microsoft.com/office/drawing/2014/main" id="{05486D93-840D-8B3F-3089-413EBEAD7082}"/>
+              </a:ext>
+            </a:extLst>
+          </p:cNvPr>
+          <p:cNvSpPr>
+            <a:spLocks noGrp="1"/>
+          </p:cNvSpPr>
+          <p:nvPr>
+            <p:ph type="title"/>
+          </p:nvPr>
+        </p:nvSpPr>
+        <p:spPr/>
+        <p:txBody>
+          <a:bodyPr/>
+          <a:lstStyle/>
+          <a:p>
+            <a:r>
+              <a:rPr lang="en-US" dirty="0">
+                <a:solidFill>
+                  <a:srgbClr val="FFFF00"/>
+                </a:solidFill>
+              </a:rPr>
+              <a:t>ARC</a:t>
+            </a:r>
+            <a:endParaRPr lang="ru-RU" dirty="0">
+              <a:solidFill>
+                <a:srgbClr val="FFFF00"/>
+              </a:solidFill>
+            </a:endParaRPr>
+          </a:p>
+        </p:txBody>
+      </p:sp>
+      <p:sp>
+        <p:nvSpPr>
+          <p:cNvPr id="3" name="Объект 2">
+            <a:extLst>
+              <a:ext uri="{FF2B5EF4-FFF2-40B4-BE49-F238E27FC236}">
+                <a16:creationId xmlns:a16="http://schemas.microsoft.com/office/drawing/2014/main" id="{19FAC263-B8E4-5670-E1AE-6B78B62A721E}"/>
+              </a:ext>
+            </a:extLst>
+          </p:cNvPr>
+          <p:cNvSpPr>
+            <a:spLocks noGrp="1"/>
+          </p:cNvSpPr>
+          <p:nvPr>
+            <p:ph idx="1"/>
+          </p:nvPr>
+        </p:nvSpPr>
+        <p:spPr/>
+        <p:txBody>
+          <a:bodyPr/>
+          <a:lstStyle/>
+          <a:p>
+            <a:endParaRPr lang="ru-RU"/>
+          </a:p>
+        </p:txBody>
+      </p:sp>
+    </p:spTree>
+    <p:extLst>
+      <p:ext uri="{BB962C8B-B14F-4D97-AF65-F5344CB8AC3E}">
+        <p14:creationId xmlns:p14="http://schemas.microsoft.com/office/powerpoint/2010/main" val="3195558694"/>
+      </p:ext>
+    </p:extLst>
+  </p:cSld>
+  <p:clrMapOvr>
+    <a:masterClrMapping/>
+  </p:clrMapOvr>
+</p:sld>
+</file>
+
+<file path=ppt/slides/slide13.xml><?xml version="1.0" encoding="utf-8"?>
+<p:sld xmlns:a="http://schemas.openxmlformats.org/drawingml/2006/main" xmlns:r="http://schemas.openxmlformats.org/officeDocument/2006/relationships" xmlns:p="http://schemas.openxmlformats.org/presentationml/2006/main">
+  <p:cSld>
+    <p:spTree>
+      <p:nvGrpSpPr>
+        <p:cNvPr id="1" name=""/>
+        <p:cNvGrpSpPr/>
+        <p:nvPr/>
+      </p:nvGrpSpPr>
+      <p:grpSpPr>
+        <a:xfrm>
+          <a:off x="0" y="0"/>
+          <a:ext cx="0" cy="0"/>
+          <a:chOff x="0" y="0"/>
+          <a:chExt cx="0" cy="0"/>
+        </a:xfrm>
+      </p:grpSpPr>
+      <p:sp>
+        <p:nvSpPr>
+          <p:cNvPr id="2" name="Заголовок 1">
+            <a:extLst>
+              <a:ext uri="{FF2B5EF4-FFF2-40B4-BE49-F238E27FC236}">
+                <a16:creationId xmlns:a16="http://schemas.microsoft.com/office/drawing/2014/main" id="{CE3DFBBE-1258-16F5-7626-4B53EFC6C005}"/>
+              </a:ext>
+            </a:extLst>
+          </p:cNvPr>
+          <p:cNvSpPr>
+            <a:spLocks noGrp="1"/>
+          </p:cNvSpPr>
+          <p:nvPr>
+            <p:ph type="title"/>
+          </p:nvPr>
+        </p:nvSpPr>
+        <p:spPr/>
+        <p:txBody>
+          <a:bodyPr/>
+          <a:lstStyle/>
+          <a:p>
+            <a:r>
+              <a:rPr lang="en" sz="4400" b="0" i="0" u="none" strike="noStrike" dirty="0">
+                <a:solidFill>
+                  <a:srgbClr val="FFFF00"/>
+                </a:solidFill>
+                <a:effectLst/>
+                <a:latin typeface="+mj-lt"/>
+              </a:rPr>
+              <a:t>Weak, Strong, Unowned</a:t>
+            </a:r>
+            <a:endParaRPr lang="ru-RU" dirty="0">
+              <a:solidFill>
+                <a:srgbClr val="FFFF00"/>
+              </a:solidFill>
+            </a:endParaRPr>
+          </a:p>
+        </p:txBody>
+      </p:sp>
+      <p:sp>
+        <p:nvSpPr>
+          <p:cNvPr id="3" name="Объект 2">
+            <a:extLst>
+              <a:ext uri="{FF2B5EF4-FFF2-40B4-BE49-F238E27FC236}">
+                <a16:creationId xmlns:a16="http://schemas.microsoft.com/office/drawing/2014/main" id="{67F42960-E25D-9581-2755-04035EE0E74F}"/>
+              </a:ext>
+            </a:extLst>
+          </p:cNvPr>
+          <p:cNvSpPr>
+            <a:spLocks noGrp="1"/>
+          </p:cNvSpPr>
+          <p:nvPr>
+            <p:ph idx="1"/>
+          </p:nvPr>
+        </p:nvSpPr>
+        <p:spPr/>
+        <p:txBody>
+          <a:bodyPr/>
+          <a:lstStyle/>
+          <a:p>
+            <a:endParaRPr lang="ru-RU"/>
+          </a:p>
+        </p:txBody>
+      </p:sp>
+    </p:spTree>
+    <p:extLst>
+      <p:ext uri="{BB962C8B-B14F-4D97-AF65-F5344CB8AC3E}">
+        <p14:creationId xmlns:p14="http://schemas.microsoft.com/office/powerpoint/2010/main" val="1821829135"/>
+      </p:ext>
+    </p:extLst>
+  </p:cSld>
+  <p:clrMapOvr>
+    <a:masterClrMapping/>
+  </p:clrMapOvr>
+</p:sld>
+</file>
+
+<file path=ppt/slides/slide14.xml><?xml version="1.0" encoding="utf-8"?>
+<p:sld xmlns:a="http://schemas.openxmlformats.org/drawingml/2006/main" xmlns:r="http://schemas.openxmlformats.org/officeDocument/2006/relationships" xmlns:p="http://schemas.openxmlformats.org/presentationml/2006/main">
+  <p:cSld>
+    <p:spTree>
+      <p:nvGrpSpPr>
+        <p:cNvPr id="1" name=""/>
+        <p:cNvGrpSpPr/>
+        <p:nvPr/>
+      </p:nvGrpSpPr>
+      <p:grpSpPr>
+        <a:xfrm>
+          <a:off x="0" y="0"/>
+          <a:ext cx="0" cy="0"/>
+          <a:chOff x="0" y="0"/>
+          <a:chExt cx="0" cy="0"/>
+        </a:xfrm>
+      </p:grpSpPr>
+      <p:sp>
+        <p:nvSpPr>
+          <p:cNvPr id="2" name="Заголовок 1">
+            <a:extLst>
+              <a:ext uri="{FF2B5EF4-FFF2-40B4-BE49-F238E27FC236}">
+                <a16:creationId xmlns:a16="http://schemas.microsoft.com/office/drawing/2014/main" id="{F5E9D4A7-63AE-768B-E967-B61C4BF93EED}"/>
+              </a:ext>
+            </a:extLst>
+          </p:cNvPr>
+          <p:cNvSpPr>
+            <a:spLocks noGrp="1"/>
+          </p:cNvSpPr>
+          <p:nvPr>
+            <p:ph type="title"/>
+          </p:nvPr>
+        </p:nvSpPr>
+        <p:spPr/>
+        <p:txBody>
+          <a:bodyPr/>
+          <a:lstStyle/>
+          <a:p>
+            <a:r>
+              <a:rPr lang="en" sz="4400" b="0" i="0" u="none" strike="noStrike" dirty="0">
+                <a:solidFill>
+                  <a:srgbClr val="FFFF00"/>
+                </a:solidFill>
+                <a:effectLst/>
+                <a:latin typeface="+mj-lt"/>
+              </a:rPr>
+              <a:t>Swift Object Lifecycle</a:t>
+            </a:r>
+            <a:endParaRPr lang="ru-RU" dirty="0">
+              <a:solidFill>
+                <a:srgbClr val="FFFF00"/>
+              </a:solidFill>
+            </a:endParaRPr>
+          </a:p>
+        </p:txBody>
+      </p:sp>
+      <p:sp>
+        <p:nvSpPr>
+          <p:cNvPr id="3" name="Объект 2">
+            <a:extLst>
+              <a:ext uri="{FF2B5EF4-FFF2-40B4-BE49-F238E27FC236}">
+                <a16:creationId xmlns:a16="http://schemas.microsoft.com/office/drawing/2014/main" id="{A46B9563-6FD4-C902-6EB5-7969E07F2C9C}"/>
+              </a:ext>
+            </a:extLst>
+          </p:cNvPr>
+          <p:cNvSpPr>
+            <a:spLocks noGrp="1"/>
+          </p:cNvSpPr>
+          <p:nvPr>
+            <p:ph idx="1"/>
+          </p:nvPr>
+        </p:nvSpPr>
+        <p:spPr/>
+        <p:txBody>
+          <a:bodyPr/>
+          <a:lstStyle/>
+          <a:p>
+            <a:endParaRPr lang="ru-RU"/>
+          </a:p>
+        </p:txBody>
+      </p:sp>
+    </p:spTree>
+    <p:extLst>
+      <p:ext uri="{BB962C8B-B14F-4D97-AF65-F5344CB8AC3E}">
+        <p14:creationId xmlns:p14="http://schemas.microsoft.com/office/powerpoint/2010/main" val="375712703"/>
+      </p:ext>
+    </p:extLst>
+  </p:cSld>
+  <p:clrMapOvr>
+    <a:masterClrMapping/>
+  </p:clrMapOvr>
+</p:sld>
+</file>
+
+<file path=ppt/slides/slide15.xml><?xml version="1.0" encoding="utf-8"?>
+<p:sld xmlns:a="http://schemas.openxmlformats.org/drawingml/2006/main" xmlns:r="http://schemas.openxmlformats.org/officeDocument/2006/relationships" xmlns:p="http://schemas.openxmlformats.org/presentationml/2006/main">
+  <p:cSld>
+    <p:spTree>
+      <p:nvGrpSpPr>
+        <p:cNvPr id="1" name=""/>
+        <p:cNvGrpSpPr/>
+        <p:nvPr/>
+      </p:nvGrpSpPr>
+      <p:grpSpPr>
+        <a:xfrm>
+          <a:off x="0" y="0"/>
+          <a:ext cx="0" cy="0"/>
+          <a:chOff x="0" y="0"/>
+          <a:chExt cx="0" cy="0"/>
+        </a:xfrm>
+      </p:grpSpPr>
+      <p:sp>
+        <p:nvSpPr>
+          <p:cNvPr id="2" name="Заголовок 1">
+            <a:extLst>
+              <a:ext uri="{FF2B5EF4-FFF2-40B4-BE49-F238E27FC236}">
+                <a16:creationId xmlns:a16="http://schemas.microsoft.com/office/drawing/2014/main" id="{0EA4CC88-DE7D-FAB0-538E-C477F0DD9593}"/>
+              </a:ext>
+            </a:extLst>
+          </p:cNvPr>
+          <p:cNvSpPr>
+            <a:spLocks noGrp="1"/>
+          </p:cNvSpPr>
+          <p:nvPr>
+            <p:ph type="title"/>
+          </p:nvPr>
+        </p:nvSpPr>
+        <p:spPr/>
+        <p:txBody>
+          <a:bodyPr/>
+          <a:lstStyle/>
+          <a:p>
+            <a:r>
+              <a:rPr lang="en" sz="4400" dirty="0">
+                <a:solidFill>
+                  <a:srgbClr val="FFFF00"/>
+                </a:solidFill>
+                <a:latin typeface="+mj-lt"/>
+              </a:rPr>
+              <a:t>Run Loop</a:t>
+            </a:r>
+            <a:endParaRPr lang="ru-RU" dirty="0">
+              <a:solidFill>
+                <a:srgbClr val="FFFF00"/>
+              </a:solidFill>
+            </a:endParaRPr>
+          </a:p>
+        </p:txBody>
+      </p:sp>
+      <p:sp>
+        <p:nvSpPr>
+          <p:cNvPr id="3" name="Объект 2">
+            <a:extLst>
+              <a:ext uri="{FF2B5EF4-FFF2-40B4-BE49-F238E27FC236}">
+                <a16:creationId xmlns:a16="http://schemas.microsoft.com/office/drawing/2014/main" id="{7492D61D-C0CA-044D-F6A5-A6E525FD639B}"/>
+              </a:ext>
+            </a:extLst>
+          </p:cNvPr>
+          <p:cNvSpPr>
+            <a:spLocks noGrp="1"/>
+          </p:cNvSpPr>
+          <p:nvPr>
+            <p:ph idx="1"/>
+          </p:nvPr>
+        </p:nvSpPr>
+        <p:spPr/>
+        <p:txBody>
+          <a:bodyPr/>
+          <a:lstStyle/>
+          <a:p>
+            <a:endParaRPr lang="ru-RU" dirty="0"/>
+          </a:p>
+        </p:txBody>
+      </p:sp>
+    </p:spTree>
+    <p:extLst>
+      <p:ext uri="{BB962C8B-B14F-4D97-AF65-F5344CB8AC3E}">
+        <p14:creationId xmlns:p14="http://schemas.microsoft.com/office/powerpoint/2010/main" val="3559152448"/>
+      </p:ext>
+    </p:extLst>
+  </p:cSld>
+  <p:clrMapOvr>
+    <a:masterClrMapping/>
+  </p:clrMapOvr>
+</p:sld>
+</file>
+
+<file path=ppt/slides/slide16.xml><?xml version="1.0" encoding="utf-8"?>
+<p:sld xmlns:a="http://schemas.openxmlformats.org/drawingml/2006/main" xmlns:r="http://schemas.openxmlformats.org/officeDocument/2006/relationships" xmlns:p="http://schemas.openxmlformats.org/presentationml/2006/main">
+  <p:cSld>
+    <p:spTree>
+      <p:nvGrpSpPr>
+        <p:cNvPr id="1" name=""/>
+        <p:cNvGrpSpPr/>
+        <p:nvPr/>
+      </p:nvGrpSpPr>
+      <p:grpSpPr>
+        <a:xfrm>
+          <a:off x="0" y="0"/>
+          <a:ext cx="0" cy="0"/>
+          <a:chOff x="0" y="0"/>
+          <a:chExt cx="0" cy="0"/>
+        </a:xfrm>
+      </p:grpSpPr>
+      <p:sp>
+        <p:nvSpPr>
+          <p:cNvPr id="2" name="Заголовок 1">
+            <a:extLst>
+              <a:ext uri="{FF2B5EF4-FFF2-40B4-BE49-F238E27FC236}">
+                <a16:creationId xmlns:a16="http://schemas.microsoft.com/office/drawing/2014/main" id="{8143DB06-FF76-D5EF-190C-D602489B68FA}"/>
+              </a:ext>
+            </a:extLst>
+          </p:cNvPr>
+          <p:cNvSpPr>
+            <a:spLocks noGrp="1"/>
+          </p:cNvSpPr>
+          <p:nvPr>
+            <p:ph type="title"/>
+          </p:nvPr>
+        </p:nvSpPr>
+        <p:spPr/>
+        <p:txBody>
+          <a:bodyPr/>
+          <a:lstStyle/>
+          <a:p>
+            <a:r>
+              <a:rPr lang="en" sz="4400" b="0" i="0" u="none" strike="noStrike" dirty="0" err="1">
+                <a:solidFill>
+                  <a:srgbClr val="FFFF00"/>
+                </a:solidFill>
+                <a:effectLst/>
+                <a:latin typeface="+mj-lt"/>
+              </a:rPr>
+              <a:t>Autoreleasepool</a:t>
+            </a:r>
+            <a:endParaRPr lang="ru-RU" dirty="0">
+              <a:solidFill>
+                <a:srgbClr val="FFFF00"/>
+              </a:solidFill>
+            </a:endParaRPr>
+          </a:p>
+        </p:txBody>
+      </p:sp>
+      <p:sp>
+        <p:nvSpPr>
+          <p:cNvPr id="3" name="Объект 2">
+            <a:extLst>
+              <a:ext uri="{FF2B5EF4-FFF2-40B4-BE49-F238E27FC236}">
+                <a16:creationId xmlns:a16="http://schemas.microsoft.com/office/drawing/2014/main" id="{00E6139E-DC44-1D2A-58F1-FD53E2EA434C}"/>
+              </a:ext>
+            </a:extLst>
+          </p:cNvPr>
+          <p:cNvSpPr>
+            <a:spLocks noGrp="1"/>
+          </p:cNvSpPr>
+          <p:nvPr>
+            <p:ph idx="1"/>
+          </p:nvPr>
+        </p:nvSpPr>
+        <p:spPr/>
+        <p:txBody>
+          <a:bodyPr/>
+          <a:lstStyle/>
+          <a:p>
+            <a:endParaRPr lang="ru-RU"/>
+          </a:p>
+        </p:txBody>
+      </p:sp>
+    </p:spTree>
+    <p:extLst>
+      <p:ext uri="{BB962C8B-B14F-4D97-AF65-F5344CB8AC3E}">
+        <p14:creationId xmlns:p14="http://schemas.microsoft.com/office/powerpoint/2010/main" val="3200227656"/>
+      </p:ext>
+    </p:extLst>
+  </p:cSld>
+  <p:clrMapOvr>
+    <a:masterClrMapping/>
+  </p:clrMapOvr>
+</p:sld>
+</file>
+
+<file path=ppt/slides/slide17.xml><?xml version="1.0" encoding="utf-8"?>
+<p:sld xmlns:a="http://schemas.openxmlformats.org/drawingml/2006/main" xmlns:r="http://schemas.openxmlformats.org/officeDocument/2006/relationships" xmlns:p="http://schemas.openxmlformats.org/presentationml/2006/main">
+  <p:cSld>
+    <p:spTree>
+      <p:nvGrpSpPr>
+        <p:cNvPr id="1" name=""/>
+        <p:cNvGrpSpPr/>
+        <p:nvPr/>
+      </p:nvGrpSpPr>
+      <p:grpSpPr>
+        <a:xfrm>
+          <a:off x="0" y="0"/>
+          <a:ext cx="0" cy="0"/>
+          <a:chOff x="0" y="0"/>
+          <a:chExt cx="0" cy="0"/>
+        </a:xfrm>
+      </p:grpSpPr>
+      <p:sp>
+        <p:nvSpPr>
+          <p:cNvPr id="2" name="Заголовок 1">
+            <a:extLst>
+              <a:ext uri="{FF2B5EF4-FFF2-40B4-BE49-F238E27FC236}">
                 <a16:creationId xmlns:a16="http://schemas.microsoft.com/office/drawing/2014/main" id="{2951E1D8-BAC1-5ED4-268C-2AAE2E0171F8}"/>
               </a:ext>
             </a:extLst>
@@ -3245,7 +3811,32 @@
           <a:bodyPr/>
           <a:lstStyle/>
           <a:p>
-            <a:endParaRPr lang="ru-RU"/>
+            <a:r>
+              <a:rPr lang="ru-RU" dirty="0"/>
+              <a:t>Известно, что класс хранится в куче, а где хранятся его </a:t>
+            </a:r>
+            <a:r>
+              <a:rPr lang="en-US" dirty="0"/>
+              <a:t>value </a:t>
+            </a:r>
+            <a:r>
+              <a:rPr lang="ru-RU" dirty="0"/>
+              <a:t>и </a:t>
+            </a:r>
+            <a:r>
+              <a:rPr lang="en-US" dirty="0"/>
+              <a:t>reference </a:t>
+            </a:r>
+            <a:r>
+              <a:rPr lang="ru-RU" dirty="0"/>
+              <a:t>свойства (поля класса)? </a:t>
+            </a:r>
+          </a:p>
+          <a:p>
+            <a:pPr marL="0" indent="0">
+              <a:buNone/>
+            </a:pPr>
+            <a:endParaRPr lang="ru-RU" dirty="0"/>
           </a:p>
         </p:txBody>
       </p:sp>
@@ -3253,6 +3844,206 @@
     <p:extLst>
       <p:ext uri="{BB962C8B-B14F-4D97-AF65-F5344CB8AC3E}">
         <p14:creationId xmlns:p14="http://schemas.microsoft.com/office/powerpoint/2010/main" val="1463931782"/>
+      </p:ext>
+    </p:extLst>
+  </p:cSld>
+  <p:clrMapOvr>
+    <a:masterClrMapping/>
+  </p:clrMapOvr>
+</p:sld>
+</file>
+
+<file path=ppt/slides/slide18.xml><?xml version="1.0" encoding="utf-8"?>
+<p:sld xmlns:a="http://schemas.openxmlformats.org/drawingml/2006/main" xmlns:r="http://schemas.openxmlformats.org/officeDocument/2006/relationships" xmlns:p="http://schemas.openxmlformats.org/presentationml/2006/main">
+  <p:cSld>
+    <p:spTree>
+      <p:nvGrpSpPr>
+        <p:cNvPr id="1" name=""/>
+        <p:cNvGrpSpPr/>
+        <p:nvPr/>
+      </p:nvGrpSpPr>
+      <p:grpSpPr>
+        <a:xfrm>
+          <a:off x="0" y="0"/>
+          <a:ext cx="0" cy="0"/>
+          <a:chOff x="0" y="0"/>
+          <a:chExt cx="0" cy="0"/>
+        </a:xfrm>
+      </p:grpSpPr>
+      <p:sp>
+        <p:nvSpPr>
+          <p:cNvPr id="2" name="Заголовок 1">
+            <a:extLst>
+              <a:ext uri="{FF2B5EF4-FFF2-40B4-BE49-F238E27FC236}">
+                <a16:creationId xmlns:a16="http://schemas.microsoft.com/office/drawing/2014/main" id="{2951E1D8-BAC1-5ED4-268C-2AAE2E0171F8}"/>
+              </a:ext>
+            </a:extLst>
+          </p:cNvPr>
+          <p:cNvSpPr>
+            <a:spLocks noGrp="1"/>
+          </p:cNvSpPr>
+          <p:nvPr>
+            <p:ph type="title"/>
+          </p:nvPr>
+        </p:nvSpPr>
+        <p:spPr/>
+        <p:txBody>
+          <a:bodyPr/>
+          <a:lstStyle/>
+          <a:p>
+            <a:r>
+              <a:rPr lang="ru-RU" sz="4400" dirty="0">
+                <a:solidFill>
+                  <a:srgbClr val="FFFF00"/>
+                </a:solidFill>
+                <a:latin typeface="+mj-lt"/>
+              </a:rPr>
+              <a:t>Вопросы с собеседований</a:t>
+            </a:r>
+            <a:endParaRPr lang="ru-RU" dirty="0">
+              <a:solidFill>
+                <a:srgbClr val="FFFF00"/>
+              </a:solidFill>
+            </a:endParaRPr>
+          </a:p>
+        </p:txBody>
+      </p:sp>
+      <p:sp>
+        <p:nvSpPr>
+          <p:cNvPr id="3" name="Объект 2">
+            <a:extLst>
+              <a:ext uri="{FF2B5EF4-FFF2-40B4-BE49-F238E27FC236}">
+                <a16:creationId xmlns:a16="http://schemas.microsoft.com/office/drawing/2014/main" id="{09BA0977-5B01-16A1-BC13-2D0E11803D55}"/>
+              </a:ext>
+            </a:extLst>
+          </p:cNvPr>
+          <p:cNvSpPr>
+            <a:spLocks noGrp="1"/>
+          </p:cNvSpPr>
+          <p:nvPr>
+            <p:ph idx="1"/>
+          </p:nvPr>
+        </p:nvSpPr>
+        <p:spPr/>
+        <p:txBody>
+          <a:bodyPr/>
+          <a:lstStyle/>
+          <a:p>
+            <a:r>
+              <a:rPr lang="ru-RU" dirty="0"/>
+              <a:t>Есть переменная объявлена до функции и вызывается в ней, если переменная объявлена после функции и вызывается в ней, если переменная объявлена как </a:t>
+            </a:r>
+            <a:r>
+              <a:rPr lang="en-US" dirty="0"/>
+              <a:t>lazy var </a:t>
+            </a:r>
+            <a:r>
+              <a:rPr lang="ru-RU" dirty="0"/>
+              <a:t>после функции и вызывается в ней, скомпилируется ли приложение?</a:t>
+            </a:r>
+          </a:p>
+          <a:p>
+            <a:endParaRPr lang="ru-RU" dirty="0"/>
+          </a:p>
+        </p:txBody>
+      </p:sp>
+    </p:spTree>
+    <p:extLst>
+      <p:ext uri="{BB962C8B-B14F-4D97-AF65-F5344CB8AC3E}">
+        <p14:creationId xmlns:p14="http://schemas.microsoft.com/office/powerpoint/2010/main" val="2196475699"/>
+      </p:ext>
+    </p:extLst>
+  </p:cSld>
+  <p:clrMapOvr>
+    <a:masterClrMapping/>
+  </p:clrMapOvr>
+</p:sld>
+</file>
+
+<file path=ppt/slides/slide19.xml><?xml version="1.0" encoding="utf-8"?>
+<p:sld xmlns:a="http://schemas.openxmlformats.org/drawingml/2006/main" xmlns:r="http://schemas.openxmlformats.org/officeDocument/2006/relationships" xmlns:p="http://schemas.openxmlformats.org/presentationml/2006/main">
+  <p:cSld>
+    <p:spTree>
+      <p:nvGrpSpPr>
+        <p:cNvPr id="1" name=""/>
+        <p:cNvGrpSpPr/>
+        <p:nvPr/>
+      </p:nvGrpSpPr>
+      <p:grpSpPr>
+        <a:xfrm>
+          <a:off x="0" y="0"/>
+          <a:ext cx="0" cy="0"/>
+          <a:chOff x="0" y="0"/>
+          <a:chExt cx="0" cy="0"/>
+        </a:xfrm>
+      </p:grpSpPr>
+      <p:sp>
+        <p:nvSpPr>
+          <p:cNvPr id="2" name="Заголовок 1">
+            <a:extLst>
+              <a:ext uri="{FF2B5EF4-FFF2-40B4-BE49-F238E27FC236}">
+                <a16:creationId xmlns:a16="http://schemas.microsoft.com/office/drawing/2014/main" id="{2951E1D8-BAC1-5ED4-268C-2AAE2E0171F8}"/>
+              </a:ext>
+            </a:extLst>
+          </p:cNvPr>
+          <p:cNvSpPr>
+            <a:spLocks noGrp="1"/>
+          </p:cNvSpPr>
+          <p:nvPr>
+            <p:ph type="title"/>
+          </p:nvPr>
+        </p:nvSpPr>
+        <p:spPr/>
+        <p:txBody>
+          <a:bodyPr/>
+          <a:lstStyle/>
+          <a:p>
+            <a:r>
+              <a:rPr lang="ru-RU" sz="4400" dirty="0">
+                <a:solidFill>
+                  <a:srgbClr val="FFFF00"/>
+                </a:solidFill>
+                <a:latin typeface="+mj-lt"/>
+              </a:rPr>
+              <a:t>Вопросы с собеседований</a:t>
+            </a:r>
+            <a:endParaRPr lang="ru-RU" dirty="0">
+              <a:solidFill>
+                <a:srgbClr val="FFFF00"/>
+              </a:solidFill>
+            </a:endParaRPr>
+          </a:p>
+        </p:txBody>
+      </p:sp>
+      <p:sp>
+        <p:nvSpPr>
+          <p:cNvPr id="3" name="Объект 2">
+            <a:extLst>
+              <a:ext uri="{FF2B5EF4-FFF2-40B4-BE49-F238E27FC236}">
+                <a16:creationId xmlns:a16="http://schemas.microsoft.com/office/drawing/2014/main" id="{09BA0977-5B01-16A1-BC13-2D0E11803D55}"/>
+              </a:ext>
+            </a:extLst>
+          </p:cNvPr>
+          <p:cNvSpPr>
+            <a:spLocks noGrp="1"/>
+          </p:cNvSpPr>
+          <p:nvPr>
+            <p:ph idx="1"/>
+          </p:nvPr>
+        </p:nvSpPr>
+        <p:spPr/>
+        <p:txBody>
+          <a:bodyPr/>
+          <a:lstStyle/>
+          <a:p>
+            <a:endParaRPr lang="ru-RU" dirty="0"/>
+          </a:p>
+        </p:txBody>
+      </p:sp>
+    </p:spTree>
+    <p:extLst>
+      <p:ext uri="{BB962C8B-B14F-4D97-AF65-F5344CB8AC3E}">
+        <p14:creationId xmlns:p14="http://schemas.microsoft.com/office/powerpoint/2010/main" val="458179294"/>
       </p:ext>
     </p:extLst>
   </p:cSld>
@@ -3330,7 +4121,7 @@
         <p:spPr/>
         <p:txBody>
           <a:bodyPr>
-            <a:normAutofit lnSpcReduction="10000"/>
+            <a:normAutofit fontScale="85000" lnSpcReduction="20000"/>
           </a:bodyPr>
           <a:lstStyle/>
           <a:p>
@@ -3345,6 +4136,55 @@
               </a:rPr>
               <a:t>Управление памятью в современных языках программирования</a:t>
             </a:r>
+            <a:br>
+              <a:rPr lang="ru-RU" sz="2500" b="0" i="0" u="none" strike="noStrike" dirty="0">
+                <a:effectLst/>
+                <a:latin typeface="+mj-lt"/>
+              </a:rPr>
+            </a:br>
+            <a:r>
+              <a:rPr lang="ru-RU" sz="1600" b="0" i="0" u="none" strike="noStrike" dirty="0">
+                <a:effectLst/>
+                <a:latin typeface="+mj-lt"/>
+              </a:rPr>
+              <a:t>(Оперативная память (</a:t>
+            </a:r>
+            <a:r>
+              <a:rPr lang="en-US" sz="1600" b="0" i="0" u="none" strike="noStrike" dirty="0">
+                <a:effectLst/>
+                <a:latin typeface="+mj-lt"/>
+              </a:rPr>
+              <a:t>RAM), </a:t>
+            </a:r>
+            <a:r>
+              <a:rPr lang="ru-RU" sz="1600" b="0" i="0" u="none" strike="noStrike" dirty="0">
+                <a:effectLst/>
+                <a:latin typeface="+mj-lt"/>
+              </a:rPr>
+              <a:t>стек, куча, подходы к управлению памятью</a:t>
+            </a:r>
+            <a:r>
+              <a:rPr lang="en-US" sz="1600" dirty="0">
+                <a:latin typeface="+mj-lt"/>
+              </a:rPr>
+              <a:t>, </a:t>
+            </a:r>
+            <a:r>
+              <a:rPr lang="ru-RU" sz="1600" dirty="0">
+                <a:latin typeface="+mj-lt"/>
+              </a:rPr>
+              <a:t>концепция </a:t>
+            </a:r>
+            <a:r>
+              <a:rPr lang="en-US" sz="1600" dirty="0">
+                <a:latin typeface="+mj-lt"/>
+              </a:rPr>
+              <a:t>Ownership)</a:t>
+            </a:r>
+            <a:endParaRPr lang="ru-RU" sz="1600" b="0" i="0" u="none" strike="noStrike" dirty="0">
+              <a:effectLst/>
+              <a:latin typeface="+mj-lt"/>
+            </a:endParaRPr>
           </a:p>
           <a:p>
             <a:pPr algn="l" fontAlgn="base">
@@ -3425,36 +4265,53 @@
             </a:r>
           </a:p>
           <a:p>
-            <a:pPr algn="l" fontAlgn="base">
-              <a:buFont typeface="Arial" panose="020B0604020202020204" pitchFamily="34" charset="0"/>
-              <a:buChar char="•"/>
-            </a:pPr>
-            <a:r>
-              <a:rPr lang="en" sz="2500" b="0" i="0" u="none" strike="noStrike" dirty="0" err="1">
-                <a:effectLst/>
-                <a:latin typeface="+mj-lt"/>
-              </a:rPr>
-              <a:t>Autoreleasepool</a:t>
-            </a:r>
-            <a:endParaRPr lang="en" sz="2500" b="0" i="0" u="none" strike="noStrike" dirty="0">
-              <a:effectLst/>
+            <a:r>
+              <a:rPr lang="en" sz="2500" dirty="0">
+                <a:latin typeface="+mj-lt"/>
+              </a:rPr>
+              <a:t>Run Loop</a:t>
+            </a:r>
+            <a:endParaRPr lang="ru-RU" sz="2500" dirty="0">
               <a:latin typeface="+mj-lt"/>
             </a:endParaRPr>
           </a:p>
           <a:p>
             <a:r>
+              <a:rPr lang="en" sz="2500" b="0" i="0" u="none" strike="noStrike" dirty="0" err="1">
+                <a:effectLst/>
+                <a:latin typeface="+mj-lt"/>
+              </a:rPr>
+              <a:t>Autoreleasepool</a:t>
+            </a:r>
+            <a:endParaRPr lang="en" sz="2500" dirty="0">
+              <a:latin typeface="+mj-lt"/>
+            </a:endParaRPr>
+          </a:p>
+          <a:p>
+            <a:r>
+              <a:rPr lang="ru-RU" sz="2500" dirty="0">
+                <a:latin typeface="+mj-lt"/>
+              </a:rPr>
+              <a:t>Вопросы с собеседований</a:t>
+            </a:r>
+          </a:p>
+          <a:p>
+            <a:pPr marL="0" indent="0">
+              <a:buNone/>
+            </a:pPr>
+            <a:endParaRPr lang="en-US" sz="2500" dirty="0">
+              <a:latin typeface="+mj-lt"/>
+            </a:endParaRPr>
+          </a:p>
+          <a:p>
+            <a:pPr marL="0" indent="0">
+              <a:buNone/>
+            </a:pPr>
+            <a:r>
               <a:rPr lang="en" sz="2500" dirty="0">
                 <a:latin typeface="+mj-lt"/>
               </a:rPr>
-              <a:t>Run Loop</a:t>
-            </a:r>
-          </a:p>
-          <a:p>
-            <a:r>
-              <a:rPr lang="ru-RU" sz="2500" dirty="0">
-                <a:latin typeface="+mj-lt"/>
-              </a:rPr>
-              <a:t>Вопросы с собеседований</a:t>
+              <a:t>Unsafe types</a:t>
             </a:r>
             <a:br>
               <a:rPr lang="en" sz="2500" dirty="0">
@@ -3524,8 +4381,58 @@
                   <a:srgbClr val="FFFF00"/>
                 </a:solidFill>
               </a:rPr>
-              <a:t>Управление памятью в современных ЯП</a:t>
-            </a:r>
+              <a:t>Управление памятью в современных ЯП </a:t>
+            </a:r>
+            <a:br>
+              <a:rPr lang="ru-RU" dirty="0">
+                <a:solidFill>
+                  <a:srgbClr val="FFFF00"/>
+                </a:solidFill>
+              </a:rPr>
+            </a:br>
+            <a:r>
+              <a:rPr lang="ru-RU" sz="2500" dirty="0">
+                <a:solidFill>
+                  <a:srgbClr val="FFFF00"/>
+                </a:solidFill>
+              </a:rPr>
+              <a:t>(</a:t>
+            </a:r>
+            <a:r>
+              <a:rPr lang="ru-RU" sz="2500" b="0" i="0" u="none" strike="noStrike" dirty="0">
+                <a:solidFill>
+                  <a:srgbClr val="FFFF00"/>
+                </a:solidFill>
+                <a:effectLst/>
+                <a:latin typeface="+mj-lt"/>
+              </a:rPr>
+              <a:t>Оперативная память – </a:t>
+            </a:r>
+            <a:r>
+              <a:rPr lang="en-US" sz="2500" b="0" i="0" u="none" strike="noStrike" dirty="0">
+                <a:solidFill>
+                  <a:srgbClr val="FFFF00"/>
+                </a:solidFill>
+                <a:effectLst/>
+                <a:latin typeface="+mj-lt"/>
+              </a:rPr>
+              <a:t>RAM</a:t>
+            </a:r>
+            <a:r>
+              <a:rPr lang="ru-RU" sz="2500" b="0" i="0" u="none" strike="noStrike" dirty="0">
+                <a:solidFill>
+                  <a:srgbClr val="FFFF00"/>
+                </a:solidFill>
+                <a:effectLst/>
+                <a:latin typeface="+mj-lt"/>
+              </a:rPr>
+              <a:t>)</a:t>
+            </a:r>
+            <a:endParaRPr lang="ru-RU" sz="2500" dirty="0">
+              <a:solidFill>
+                <a:srgbClr val="FFFF00"/>
+              </a:solidFill>
+            </a:endParaRPr>
           </a:p>
         </p:txBody>
       </p:sp>
@@ -3553,43 +4460,269 @@
           <a:lstStyle/>
           <a:p>
             <a:r>
+              <a:rPr lang="ru-RU" sz="2500" dirty="0">
+                <a:solidFill>
+                  <a:srgbClr val="FF0000"/>
+                </a:solidFill>
+                <a:latin typeface="+mj-lt"/>
+              </a:rPr>
+              <a:t>Управление памятью </a:t>
+            </a:r>
+            <a:r>
+              <a:rPr lang="ru-RU" sz="2500" dirty="0">
+                <a:latin typeface="+mj-lt"/>
+              </a:rPr>
+              <a:t>— является важной составляющей даже в современных реалиях, потому что </a:t>
+            </a:r>
+            <a:r>
+              <a:rPr lang="ru-RU" sz="2500" dirty="0">
+                <a:solidFill>
+                  <a:srgbClr val="FF0000"/>
+                </a:solidFill>
+                <a:latin typeface="+mj-lt"/>
+              </a:rPr>
+              <a:t>неправильное использование может привести к долгой загрузке, а также к ошибкам в работе приложения</a:t>
+            </a:r>
+            <a:r>
+              <a:rPr lang="ru-RU" sz="2500" dirty="0">
+                <a:latin typeface="+mj-lt"/>
+              </a:rPr>
+              <a:t>. </a:t>
+            </a:r>
+          </a:p>
+          <a:p>
+            <a:pPr marL="0" indent="0">
+              <a:buNone/>
+            </a:pPr>
+            <a:endParaRPr lang="ru-RU" sz="2500" dirty="0">
+              <a:latin typeface="+mj-lt"/>
+            </a:endParaRPr>
+          </a:p>
+          <a:p>
+            <a:pPr algn="l"/>
+            <a:r>
+              <a:rPr lang="ru-RU" sz="2500" b="0" i="0" u="none" strike="noStrike" dirty="0">
+                <a:solidFill>
+                  <a:srgbClr val="FF0000"/>
+                </a:solidFill>
+                <a:effectLst/>
+                <a:latin typeface="+mj-lt"/>
+              </a:rPr>
+              <a:t>Когда программа выполняется</a:t>
+            </a:r>
+            <a:r>
+              <a:rPr lang="ru-RU" sz="2500" b="0" i="0" u="none" strike="noStrike" dirty="0">
+                <a:effectLst/>
+                <a:latin typeface="+mj-lt"/>
+              </a:rPr>
+              <a:t> в операционный системе компьютера, </a:t>
+            </a:r>
+            <a:r>
+              <a:rPr lang="ru-RU" sz="2500" b="0" i="0" u="none" strike="noStrike" dirty="0">
+                <a:solidFill>
+                  <a:srgbClr val="FF0000"/>
+                </a:solidFill>
+                <a:effectLst/>
+                <a:latin typeface="+mj-lt"/>
+              </a:rPr>
+              <a:t>она нуждается в доступе к оперативной памяти (</a:t>
+            </a:r>
+            <a:r>
+              <a:rPr lang="en" sz="2500" b="0" i="0" u="none" strike="noStrike" dirty="0">
+                <a:solidFill>
+                  <a:srgbClr val="FF0000"/>
+                </a:solidFill>
+                <a:effectLst/>
+                <a:latin typeface="+mj-lt"/>
+              </a:rPr>
+              <a:t>RAM)</a:t>
+            </a:r>
+            <a:r>
+              <a:rPr lang="en" sz="2500" b="0" i="0" u="none" strike="noStrike" dirty="0">
+                <a:effectLst/>
+                <a:latin typeface="+mj-lt"/>
+              </a:rPr>
+              <a:t> </a:t>
+            </a:r>
+            <a:r>
+              <a:rPr lang="ru-RU" sz="2500" b="0" i="0" u="none" strike="noStrike" dirty="0">
+                <a:effectLst/>
+                <a:latin typeface="+mj-lt"/>
+              </a:rPr>
+              <a:t>для того, чтобы:</a:t>
+            </a:r>
+          </a:p>
+          <a:p>
+            <a:pPr lvl="1"/>
+            <a:r>
+              <a:rPr lang="ru-RU" sz="1500" b="0" i="0" u="none" strike="noStrike" dirty="0">
+                <a:effectLst/>
+                <a:latin typeface="+mj-lt"/>
+              </a:rPr>
+              <a:t>загружать свой </a:t>
+            </a:r>
+            <a:r>
+              <a:rPr lang="ru-RU" sz="1500" b="0" i="0" u="none" strike="noStrike" dirty="0">
+                <a:solidFill>
+                  <a:srgbClr val="FF0000"/>
+                </a:solidFill>
+                <a:effectLst/>
+                <a:latin typeface="+mj-lt"/>
+              </a:rPr>
+              <a:t>собственный байт-код </a:t>
+            </a:r>
+            <a:r>
+              <a:rPr lang="ru-RU" sz="1500" b="0" i="0" u="none" strike="noStrike" dirty="0">
+                <a:effectLst/>
+                <a:latin typeface="+mj-lt"/>
+              </a:rPr>
+              <a:t>для выполнения;</a:t>
+            </a:r>
+          </a:p>
+          <a:p>
+            <a:pPr lvl="1"/>
+            <a:r>
+              <a:rPr lang="ru-RU" sz="1500" b="0" i="0" u="none" strike="noStrike" dirty="0">
+                <a:solidFill>
+                  <a:srgbClr val="FF0000"/>
+                </a:solidFill>
+                <a:effectLst/>
+                <a:latin typeface="+mj-lt"/>
+              </a:rPr>
+              <a:t>хранить значения переменных и структуры данных</a:t>
+            </a:r>
+            <a:r>
+              <a:rPr lang="ru-RU" sz="1500" b="0" i="0" u="none" strike="noStrike" dirty="0">
+                <a:effectLst/>
+                <a:latin typeface="+mj-lt"/>
+              </a:rPr>
+              <a:t>, которые используются в процессе работы;</a:t>
+            </a:r>
+          </a:p>
+          <a:p>
+            <a:pPr lvl="1"/>
+            <a:r>
+              <a:rPr lang="ru-RU" sz="1500" b="0" i="0" u="none" strike="noStrike" dirty="0">
+                <a:solidFill>
+                  <a:srgbClr val="FF0000"/>
+                </a:solidFill>
+                <a:effectLst/>
+                <a:latin typeface="+mj-lt"/>
+              </a:rPr>
+              <a:t>загружать внешние модули</a:t>
+            </a:r>
+            <a:r>
+              <a:rPr lang="ru-RU" sz="1500" b="0" i="0" u="none" strike="noStrike" dirty="0">
+                <a:effectLst/>
+                <a:latin typeface="+mj-lt"/>
+              </a:rPr>
+              <a:t>, которые необходимы программе для выполнения задач.</a:t>
+            </a:r>
+          </a:p>
+          <a:p>
+            <a:pPr lvl="1"/>
+            <a:r>
               <a:rPr lang="ru-RU" sz="1500" dirty="0">
                 <a:latin typeface="+mj-lt"/>
               </a:rPr>
-              <a:t>Управление памятью — является важной даже в современных технологиях</a:t>
-            </a:r>
-            <a:r>
-              <a:rPr lang="ru-RU" sz="1500">
-                <a:latin typeface="+mj-lt"/>
-              </a:rPr>
-              <a:t>. </a:t>
-            </a:r>
-          </a:p>
-          <a:p>
-            <a:r>
-              <a:rPr lang="ru-RU" sz="1500">
-                <a:latin typeface="+mj-lt"/>
-              </a:rPr>
-              <a:t>Неправильное </a:t>
+              <a:t>выделять </a:t>
+            </a:r>
+            <a:r>
+              <a:rPr lang="ru-RU" sz="1500" b="0" i="0" u="none" strike="noStrike" dirty="0">
+                <a:effectLst/>
+                <a:latin typeface="+mj-lt"/>
+              </a:rPr>
+              <a:t>область в оп</a:t>
             </a:r>
             <a:r>
               <a:rPr lang="ru-RU" sz="1500" dirty="0">
                 <a:latin typeface="+mj-lt"/>
               </a:rPr>
-              <a:t>использование может привести к долгой загрузке, </a:t>
-            </a:r>
-            <a:r>
-              <a:rPr lang="ru-RU" sz="1500" dirty="0" err="1">
-                <a:latin typeface="+mj-lt"/>
-              </a:rPr>
-              <a:t>крашам</a:t>
+              <a:t>еративной памяти </a:t>
             </a:r>
             <a:r>
               <a:rPr lang="ru-RU" sz="1500" dirty="0">
-                <a:latin typeface="+mj-lt"/>
-              </a:rPr>
-              <a:t> приложения. </a:t>
-            </a:r>
+                <a:solidFill>
+                  <a:srgbClr val="FF0000"/>
+                </a:solidFill>
+                <a:latin typeface="+mj-lt"/>
+              </a:rPr>
+              <a:t>для стека</a:t>
+            </a:r>
+          </a:p>
+          <a:p>
+            <a:pPr lvl="1"/>
+            <a:r>
+              <a:rPr lang="ru-RU" sz="1500" b="0" i="0" u="none" strike="noStrike" dirty="0">
+                <a:effectLst/>
+                <a:latin typeface="+mj-lt"/>
+              </a:rPr>
+              <a:t>выделять область в оп</a:t>
+            </a:r>
+            <a:r>
+              <a:rPr lang="ru-RU" sz="1500" dirty="0">
+                <a:latin typeface="+mj-lt"/>
+              </a:rPr>
+              <a:t>еративной памяти </a:t>
+            </a:r>
+            <a:r>
+              <a:rPr lang="ru-RU" sz="1500" dirty="0">
+                <a:solidFill>
+                  <a:srgbClr val="FF0000"/>
+                </a:solidFill>
+                <a:latin typeface="+mj-lt"/>
+              </a:rPr>
+              <a:t>для кучи</a:t>
+            </a:r>
+          </a:p>
+          <a:p>
+            <a:pPr marL="457200" lvl="1" indent="0">
+              <a:buNone/>
+            </a:pPr>
+            <a:br>
+              <a:rPr lang="ru-RU" sz="800" b="0" i="0" u="none" strike="noStrike" dirty="0">
+                <a:solidFill>
+                  <a:srgbClr val="FF0000"/>
+                </a:solidFill>
+                <a:effectLst/>
+                <a:latin typeface="+mj-lt"/>
+              </a:rPr>
+            </a:br>
+            <a:br>
+              <a:rPr lang="ru-RU" sz="800" dirty="0">
+                <a:solidFill>
+                  <a:srgbClr val="FF0000"/>
+                </a:solidFill>
+                <a:latin typeface="+mj-lt"/>
+              </a:rPr>
+            </a:br>
+            <a:endParaRPr lang="ru-RU" sz="800" dirty="0">
+              <a:latin typeface="+mj-lt"/>
+            </a:endParaRPr>
+          </a:p>
+          <a:p>
+            <a:pPr marL="457200" lvl="1" indent="0">
+              <a:buNone/>
+            </a:pPr>
+            <a:endParaRPr lang="ru-RU" sz="1200" dirty="0">
+              <a:latin typeface="+mj-lt"/>
+            </a:endParaRPr>
+          </a:p>
+          <a:p>
+            <a:pPr marL="457200" lvl="1" indent="0">
+              <a:buNone/>
+            </a:pPr>
+            <a:endParaRPr lang="ru-RU" sz="1200" dirty="0">
+              <a:latin typeface="+mj-lt"/>
+            </a:endParaRPr>
+          </a:p>
+          <a:p>
+            <a:pPr marL="457200" lvl="1" indent="0">
+              <a:buNone/>
+            </a:pPr>
+            <a:endParaRPr lang="ru-RU" sz="1200" dirty="0">
+              <a:latin typeface="+mj-lt"/>
+            </a:endParaRPr>
           </a:p>
         </p:txBody>
       </p:sp>
@@ -3628,7 +4761,7 @@
           <p:cNvPr id="2" name="Заголовок 1">
             <a:extLst>
               <a:ext uri="{FF2B5EF4-FFF2-40B4-BE49-F238E27FC236}">
-                <a16:creationId xmlns:a16="http://schemas.microsoft.com/office/drawing/2014/main" id="{F1767101-7A03-66B6-794C-66CA9DC3475F}"/>
+                <a16:creationId xmlns:a16="http://schemas.microsoft.com/office/drawing/2014/main" id="{6FF5EB0D-BD4B-D209-53BB-29ACE81D04AB}"/>
               </a:ext>
             </a:extLst>
           </p:cNvPr>
@@ -3645,18 +4778,28 @@
           <a:lstStyle/>
           <a:p>
             <a:r>
-              <a:rPr lang="en-US" dirty="0">
+              <a:rPr lang="ru-RU" dirty="0">
                 <a:solidFill>
                   <a:srgbClr val="FFFF00"/>
                 </a:solidFill>
               </a:rPr>
-              <a:t>Value/Reference types</a:t>
-            </a:r>
-            <a:endParaRPr lang="ru-RU" dirty="0">
-              <a:solidFill>
-                <a:srgbClr val="FFFF00"/>
-              </a:solidFill>
-            </a:endParaRPr>
+              <a:t>Управление памятью в современных ЯП</a:t>
+            </a:r>
+            <a:br>
+              <a:rPr lang="ru-RU" dirty="0">
+                <a:solidFill>
+                  <a:srgbClr val="FFFF00"/>
+                </a:solidFill>
+              </a:rPr>
+            </a:br>
+            <a:r>
+              <a:rPr lang="ru-RU" sz="2500" dirty="0">
+                <a:solidFill>
+                  <a:srgbClr val="FFFF00"/>
+                </a:solidFill>
+              </a:rPr>
+              <a:t>(Стек)</a:t>
+            </a:r>
           </a:p>
         </p:txBody>
       </p:sp>
@@ -3665,7 +4808,7 @@
           <p:cNvPr id="3" name="Объект 2">
             <a:extLst>
               <a:ext uri="{FF2B5EF4-FFF2-40B4-BE49-F238E27FC236}">
-                <a16:creationId xmlns:a16="http://schemas.microsoft.com/office/drawing/2014/main" id="{863C2EB8-9081-A36C-99EB-3392D4456F9E}"/>
+                <a16:creationId xmlns:a16="http://schemas.microsoft.com/office/drawing/2014/main" id="{B609F2BD-30CD-6C15-FED6-F0E01845923D}"/>
               </a:ext>
             </a:extLst>
           </p:cNvPr>
@@ -3676,19 +4819,212 @@
             <p:ph idx="1"/>
           </p:nvPr>
         </p:nvSpPr>
-        <p:spPr/>
-        <p:txBody>
-          <a:bodyPr/>
-          <a:lstStyle/>
-          <a:p>
-            <a:endParaRPr lang="ru-RU" dirty="0"/>
+        <p:spPr>
+          <a:xfrm>
+            <a:off x="838200" y="1825625"/>
+            <a:ext cx="10515600" cy="4470072"/>
+          </a:xfrm>
+        </p:spPr>
+        <p:txBody>
+          <a:bodyPr>
+            <a:normAutofit lnSpcReduction="10000"/>
+          </a:bodyPr>
+          <a:lstStyle/>
+          <a:p>
+            <a:pPr algn="l"/>
+            <a:r>
+              <a:rPr lang="ru-RU" sz="2500" dirty="0">
+                <a:solidFill>
+                  <a:srgbClr val="FF0000"/>
+                </a:solidFill>
+                <a:latin typeface="+mj-lt"/>
+              </a:rPr>
+              <a:t>Стек - </a:t>
+            </a:r>
+            <a:r>
+              <a:rPr lang="ru-RU" sz="2500" dirty="0">
+                <a:latin typeface="+mj-lt"/>
+              </a:rPr>
+              <a:t>п</a:t>
+            </a:r>
+            <a:r>
+              <a:rPr lang="ru-RU" sz="2500" b="0" i="0" u="none" strike="noStrike" dirty="0">
+                <a:effectLst/>
+                <a:latin typeface="+mj-lt"/>
+              </a:rPr>
+              <a:t>еременные, выделенные в стеке, хранятся непосредственно в памяти, и доступ к этой памяти очень быстрый, и ее выделение определяется при компиляции программы</a:t>
+            </a:r>
+          </a:p>
+          <a:p>
+            <a:pPr lvl="1"/>
+            <a:r>
+              <a:rPr lang="ru-RU" sz="1500" b="0" i="0" u="none" strike="noStrike" dirty="0">
+                <a:effectLst/>
+                <a:latin typeface="-apple-system"/>
+              </a:rPr>
+              <a:t>Стек используется для статичного выделения памяти. Он организован по принципу «последним пришёл — первым вышел» (</a:t>
+            </a:r>
+            <a:r>
+              <a:rPr lang="en" sz="1500" b="1" i="0" u="none" strike="noStrike" dirty="0">
+                <a:effectLst/>
+                <a:latin typeface="-apple-system"/>
+              </a:rPr>
+              <a:t>LIFO</a:t>
+            </a:r>
+            <a:r>
+              <a:rPr lang="en" sz="1500" b="0" i="0" u="none" strike="noStrike" dirty="0">
+                <a:effectLst/>
+                <a:latin typeface="-apple-system"/>
+              </a:rPr>
+              <a:t>). </a:t>
+            </a:r>
+            <a:r>
+              <a:rPr lang="ru-RU" sz="1500" b="0" i="0" u="none" strike="noStrike" dirty="0">
+                <a:effectLst/>
+                <a:latin typeface="-apple-system"/>
+              </a:rPr>
+              <a:t>Можно представить стек как стопку книг — разрешено взаимодействовать только с самой верхней книгой: прочитать её или положить на неё новую.</a:t>
+            </a:r>
+          </a:p>
+          <a:p>
+            <a:pPr lvl="1"/>
+            <a:r>
+              <a:rPr lang="ru-RU" sz="1500" b="0" i="0" u="none" strike="noStrike" dirty="0">
+                <a:effectLst/>
+                <a:latin typeface="-apple-system"/>
+              </a:rPr>
+              <a:t>Стек позволяет очень быстро выполнять операции с данными — все манипуляции производятся с «верхней книгой в стопке». Книга добавляется в самый верх, если нужно сохранить данные, либо берётся сверху, если данные требуется прочитать;</a:t>
+            </a:r>
+          </a:p>
+          <a:p>
+            <a:pPr lvl="1"/>
+            <a:r>
+              <a:rPr lang="ru-RU" sz="1500" b="0" i="0" u="none" strike="noStrike" dirty="0">
+                <a:effectLst/>
+                <a:latin typeface="-apple-system"/>
+              </a:rPr>
+              <a:t>Существует ограничение в том, что данные, которые предполагается хранить в стеке, обязаны быть конечными и статичными — их размер должен быть известен ещё на этапе компиляции;</a:t>
+            </a:r>
+          </a:p>
+          <a:p>
+            <a:pPr lvl="1"/>
+            <a:r>
+              <a:rPr lang="ru-RU" sz="1500" b="0" i="0" u="none" strike="noStrike" dirty="0">
+                <a:effectLst/>
+                <a:latin typeface="-apple-system"/>
+              </a:rPr>
+              <a:t>Каждый поток многопоточного приложения имеет доступ к своему собственному стеку;</a:t>
+            </a:r>
+          </a:p>
+          <a:p>
+            <a:pPr lvl="1"/>
+            <a:r>
+              <a:rPr lang="ru-RU" sz="1500" b="0" i="0" u="none" strike="noStrike" dirty="0">
+                <a:effectLst/>
+                <a:latin typeface="-apple-system"/>
+              </a:rPr>
+              <a:t>Когда функция вызывается, все локальные экземпляры этой функции будут помещены в текущий стек. И как только функция вернется, все экземпляры будут удалены из стека.</a:t>
+            </a:r>
+          </a:p>
+          <a:p>
+            <a:pPr lvl="1"/>
+            <a:r>
+              <a:rPr lang="ru-RU" sz="1500" b="0" i="0" u="none" strike="noStrike" dirty="0">
+                <a:effectLst/>
+                <a:latin typeface="-apple-system"/>
+              </a:rPr>
+              <a:t>Если размер вашего </a:t>
+            </a:r>
+            <a:r>
+              <a:rPr lang="en" sz="1500" b="0" i="0" u="none" strike="noStrike" dirty="0">
+                <a:effectLst/>
+                <a:latin typeface="-apple-system"/>
+              </a:rPr>
+              <a:t>value type </a:t>
+            </a:r>
+            <a:r>
+              <a:rPr lang="ru-RU" sz="1500" b="0" i="0" u="none" strike="noStrike" dirty="0">
+                <a:effectLst/>
+                <a:latin typeface="-apple-system"/>
+              </a:rPr>
+              <a:t>может быть определен во время компиляции или если ваш </a:t>
+            </a:r>
+            <a:r>
+              <a:rPr lang="en" sz="1500" b="0" i="0" u="none" strike="noStrike" dirty="0">
+                <a:effectLst/>
+                <a:latin typeface="-apple-system"/>
+              </a:rPr>
+              <a:t>value type </a:t>
+            </a:r>
+            <a:r>
+              <a:rPr lang="ru-RU" sz="1500" b="0" i="0" u="none" strike="noStrike" dirty="0">
+                <a:effectLst/>
+                <a:latin typeface="-apple-system"/>
+              </a:rPr>
+              <a:t>не содержит рекурсию на себя или не находится в ссылочном типе, тогда потребуется выделение стека.</a:t>
+            </a:r>
+          </a:p>
+          <a:p>
+            <a:pPr algn="l"/>
+            <a:endParaRPr lang="ru-RU" sz="1500" dirty="0">
+              <a:latin typeface="+mj-lt"/>
+            </a:endParaRPr>
+          </a:p>
+          <a:p>
+            <a:pPr marL="457200" lvl="1" indent="0">
+              <a:buNone/>
+            </a:pPr>
+            <a:br>
+              <a:rPr lang="ru-RU" sz="800" b="0" i="0" u="none" strike="noStrike" dirty="0">
+                <a:solidFill>
+                  <a:srgbClr val="FF0000"/>
+                </a:solidFill>
+                <a:effectLst/>
+                <a:latin typeface="+mj-lt"/>
+              </a:rPr>
+            </a:br>
+            <a:br>
+              <a:rPr lang="ru-RU" sz="800" dirty="0">
+                <a:solidFill>
+                  <a:srgbClr val="FF0000"/>
+                </a:solidFill>
+                <a:latin typeface="+mj-lt"/>
+              </a:rPr>
+            </a:br>
+            <a:endParaRPr lang="ru-RU" sz="800" dirty="0">
+              <a:latin typeface="+mj-lt"/>
+            </a:endParaRPr>
+          </a:p>
+          <a:p>
+            <a:pPr marL="457200" lvl="1" indent="0">
+              <a:buNone/>
+            </a:pPr>
+            <a:endParaRPr lang="ru-RU" sz="1200" dirty="0">
+              <a:latin typeface="+mj-lt"/>
+            </a:endParaRPr>
+          </a:p>
+          <a:p>
+            <a:pPr marL="457200" lvl="1" indent="0">
+              <a:buNone/>
+            </a:pPr>
+            <a:endParaRPr lang="ru-RU" sz="1200" dirty="0">
+              <a:latin typeface="+mj-lt"/>
+            </a:endParaRPr>
+          </a:p>
+          <a:p>
+            <a:pPr marL="457200" lvl="1" indent="0">
+              <a:buNone/>
+            </a:pPr>
+            <a:endParaRPr lang="ru-RU" sz="1200" dirty="0">
+              <a:latin typeface="+mj-lt"/>
+            </a:endParaRPr>
           </a:p>
         </p:txBody>
       </p:sp>
     </p:spTree>
     <p:extLst>
       <p:ext uri="{BB962C8B-B14F-4D97-AF65-F5344CB8AC3E}">
-        <p14:creationId xmlns:p14="http://schemas.microsoft.com/office/powerpoint/2010/main" val="2660883994"/>
+        <p14:creationId xmlns:p14="http://schemas.microsoft.com/office/powerpoint/2010/main" val="305251363"/>
       </p:ext>
     </p:extLst>
   </p:cSld>
@@ -3720,7 +5056,7 @@
           <p:cNvPr id="2" name="Заголовок 1">
             <a:extLst>
               <a:ext uri="{FF2B5EF4-FFF2-40B4-BE49-F238E27FC236}">
-                <a16:creationId xmlns:a16="http://schemas.microsoft.com/office/drawing/2014/main" id="{12B45902-42EB-BD5C-45F3-8466D644BAC5}"/>
+                <a16:creationId xmlns:a16="http://schemas.microsoft.com/office/drawing/2014/main" id="{6FF5EB0D-BD4B-D209-53BB-29ACE81D04AB}"/>
               </a:ext>
             </a:extLst>
           </p:cNvPr>
@@ -3737,18 +5073,28 @@
           <a:lstStyle/>
           <a:p>
             <a:r>
-              <a:rPr lang="en-US" dirty="0">
+              <a:rPr lang="ru-RU" dirty="0">
                 <a:solidFill>
                   <a:srgbClr val="FFFF00"/>
                 </a:solidFill>
               </a:rPr>
-              <a:t>MRC</a:t>
-            </a:r>
-            <a:endParaRPr lang="ru-RU" dirty="0">
-              <a:solidFill>
-                <a:srgbClr val="FFFF00"/>
-              </a:solidFill>
-            </a:endParaRPr>
+              <a:t>Управление памятью в современных ЯП</a:t>
+            </a:r>
+            <a:br>
+              <a:rPr lang="ru-RU" dirty="0">
+                <a:solidFill>
+                  <a:srgbClr val="FFFF00"/>
+                </a:solidFill>
+              </a:rPr>
+            </a:br>
+            <a:r>
+              <a:rPr lang="ru-RU" sz="2500" dirty="0">
+                <a:solidFill>
+                  <a:srgbClr val="FFFF00"/>
+                </a:solidFill>
+              </a:rPr>
+              <a:t>(Куча)</a:t>
+            </a:r>
           </a:p>
         </p:txBody>
       </p:sp>
@@ -3757,7 +5103,7 @@
           <p:cNvPr id="3" name="Объект 2">
             <a:extLst>
               <a:ext uri="{FF2B5EF4-FFF2-40B4-BE49-F238E27FC236}">
-                <a16:creationId xmlns:a16="http://schemas.microsoft.com/office/drawing/2014/main" id="{388D3471-DB3F-4D30-BFC6-AA19B72AD206}"/>
+                <a16:creationId xmlns:a16="http://schemas.microsoft.com/office/drawing/2014/main" id="{B609F2BD-30CD-6C15-FED6-F0E01845923D}"/>
               </a:ext>
             </a:extLst>
           </p:cNvPr>
@@ -3770,17 +5116,99 @@
         </p:nvSpPr>
         <p:spPr/>
         <p:txBody>
-          <a:bodyPr/>
-          <a:lstStyle/>
-          <a:p>
-            <a:endParaRPr lang="ru-RU"/>
+          <a:bodyPr>
+            <a:normAutofit/>
+          </a:bodyPr>
+          <a:lstStyle/>
+          <a:p>
+            <a:pPr algn="l"/>
+            <a:r>
+              <a:rPr lang="ru-RU" sz="2500" dirty="0">
+                <a:solidFill>
+                  <a:srgbClr val="FF0000"/>
+                </a:solidFill>
+                <a:latin typeface="+mj-lt"/>
+              </a:rPr>
+              <a:t>Куча - </a:t>
+            </a:r>
+            <a:r>
+              <a:rPr lang="ru-RU" sz="2500" b="0" i="0" u="none" strike="noStrike" dirty="0">
+                <a:effectLst/>
+                <a:latin typeface="+mj-lt"/>
+              </a:rPr>
+              <a:t>используется для динамического выделения памяти, однако, в отличие от стека, данные в куче первым делом требуется найти с помощью «оглавления». Можно представить, что куча это такая большая многоуровневая библиотека, в которой, следуя определённым инструкциям, можно найти необходимую книгу.</a:t>
+            </a:r>
+          </a:p>
+          <a:p>
+            <a:pPr lvl="1"/>
+            <a:r>
+              <a:rPr lang="ru-RU" sz="1500" b="0" i="0" u="none" strike="noStrike" dirty="0">
+                <a:effectLst/>
+                <a:latin typeface="-apple-system"/>
+              </a:rPr>
+              <a:t>Операции на куче производятся несколько медленнее, чем на стеке, так как требуют дополнительного этапа для поиска данных;</a:t>
+            </a:r>
+          </a:p>
+          <a:p>
+            <a:pPr lvl="1"/>
+            <a:r>
+              <a:rPr lang="ru-RU" sz="1500" b="0" i="0" u="none" strike="noStrike" dirty="0">
+                <a:effectLst/>
+                <a:latin typeface="-apple-system"/>
+              </a:rPr>
+              <a:t>В куче хранятся данные динамических размеров, например, список, в который можно добавлять произвольное количество элементов;</a:t>
+            </a:r>
+          </a:p>
+          <a:p>
+            <a:pPr lvl="1"/>
+            <a:r>
+              <a:rPr lang="ru-RU" sz="1500" b="0" i="0" u="none" strike="noStrike" dirty="0">
+                <a:effectLst/>
+                <a:latin typeface="-apple-system"/>
+              </a:rPr>
+              <a:t>Куча общая для всех потоков приложения;</a:t>
+            </a:r>
+          </a:p>
+          <a:p>
+            <a:pPr lvl="1"/>
+            <a:r>
+              <a:rPr lang="ru-RU" sz="1500" b="0" i="0" u="none" strike="noStrike" dirty="0">
+                <a:effectLst/>
+                <a:latin typeface="-apple-system"/>
+              </a:rPr>
+              <a:t>Вследствие динамической природы, куча нетривиальна в управлении и с ней возникает большинство всех проблем и ошибок, связанных с памятью. Способы решения этих проблем предоставляются языками программирования;</a:t>
+            </a:r>
+          </a:p>
+          <a:p>
+            <a:pPr marL="457200" lvl="1" indent="0">
+              <a:buNone/>
+            </a:pPr>
+            <a:endParaRPr lang="ru-RU" sz="1200" dirty="0">
+              <a:latin typeface="+mj-lt"/>
+            </a:endParaRPr>
+          </a:p>
+          <a:p>
+            <a:pPr marL="457200" lvl="1" indent="0">
+              <a:buNone/>
+            </a:pPr>
+            <a:endParaRPr lang="ru-RU" sz="1200" dirty="0">
+              <a:latin typeface="+mj-lt"/>
+            </a:endParaRPr>
+          </a:p>
+          <a:p>
+            <a:pPr marL="457200" lvl="1" indent="0">
+              <a:buNone/>
+            </a:pPr>
+            <a:endParaRPr lang="ru-RU" sz="1200" dirty="0">
+              <a:latin typeface="+mj-lt"/>
+            </a:endParaRPr>
           </a:p>
         </p:txBody>
       </p:sp>
     </p:spTree>
     <p:extLst>
       <p:ext uri="{BB962C8B-B14F-4D97-AF65-F5344CB8AC3E}">
-        <p14:creationId xmlns:p14="http://schemas.microsoft.com/office/powerpoint/2010/main" val="51319313"/>
+        <p14:creationId xmlns:p14="http://schemas.microsoft.com/office/powerpoint/2010/main" val="1253033225"/>
       </p:ext>
     </p:extLst>
   </p:cSld>
@@ -3812,7 +5240,7 @@
           <p:cNvPr id="2" name="Заголовок 1">
             <a:extLst>
               <a:ext uri="{FF2B5EF4-FFF2-40B4-BE49-F238E27FC236}">
-                <a16:creationId xmlns:a16="http://schemas.microsoft.com/office/drawing/2014/main" id="{05486D93-840D-8B3F-3089-413EBEAD7082}"/>
+                <a16:creationId xmlns:a16="http://schemas.microsoft.com/office/drawing/2014/main" id="{6FF5EB0D-BD4B-D209-53BB-29ACE81D04AB}"/>
               </a:ext>
             </a:extLst>
           </p:cNvPr>
@@ -3829,18 +5257,28 @@
           <a:lstStyle/>
           <a:p>
             <a:r>
-              <a:rPr lang="en-US" dirty="0">
+              <a:rPr lang="ru-RU" dirty="0">
                 <a:solidFill>
                   <a:srgbClr val="FFFF00"/>
                 </a:solidFill>
               </a:rPr>
-              <a:t>ARC</a:t>
-            </a:r>
-            <a:endParaRPr lang="ru-RU" dirty="0">
-              <a:solidFill>
-                <a:srgbClr val="FFFF00"/>
-              </a:solidFill>
-            </a:endParaRPr>
+              <a:t>Управление памятью в современных ЯП</a:t>
+            </a:r>
+            <a:br>
+              <a:rPr lang="ru-RU" dirty="0">
+                <a:solidFill>
+                  <a:srgbClr val="FFFF00"/>
+                </a:solidFill>
+              </a:rPr>
+            </a:br>
+            <a:r>
+              <a:rPr lang="ru-RU" sz="2500" dirty="0">
+                <a:solidFill>
+                  <a:srgbClr val="FFFF00"/>
+                </a:solidFill>
+              </a:rPr>
+              <a:t>(Подходы к управлению памятью)</a:t>
+            </a:r>
           </a:p>
         </p:txBody>
       </p:sp>
@@ -3849,7 +5287,7 @@
           <p:cNvPr id="3" name="Объект 2">
             <a:extLst>
               <a:ext uri="{FF2B5EF4-FFF2-40B4-BE49-F238E27FC236}">
-                <a16:creationId xmlns:a16="http://schemas.microsoft.com/office/drawing/2014/main" id="{19FAC263-B8E4-5670-E1AE-6B78B62A721E}"/>
+                <a16:creationId xmlns:a16="http://schemas.microsoft.com/office/drawing/2014/main" id="{B609F2BD-30CD-6C15-FED6-F0E01845923D}"/>
               </a:ext>
             </a:extLst>
           </p:cNvPr>
@@ -3862,17 +5300,75 @@
         </p:nvSpPr>
         <p:spPr/>
         <p:txBody>
-          <a:bodyPr/>
-          <a:lstStyle/>
-          <a:p>
-            <a:endParaRPr lang="ru-RU"/>
+          <a:bodyPr>
+            <a:normAutofit/>
+          </a:bodyPr>
+          <a:lstStyle/>
+          <a:p>
+            <a:pPr algn="l">
+              <a:buFont typeface="Arial" panose="020B0604020202020204" pitchFamily="34" charset="0"/>
+              <a:buChar char="•"/>
+            </a:pPr>
+            <a:r>
+              <a:rPr lang="ru-RU" sz="2500" b="0" i="0" u="none" strike="noStrike" dirty="0">
+                <a:effectLst/>
+                <a:latin typeface="+mj-lt"/>
+              </a:rPr>
+              <a:t>Ручное управление памятью</a:t>
+            </a:r>
+            <a:endParaRPr lang="ru-RU" sz="2500" dirty="0">
+              <a:latin typeface="+mj-lt"/>
+            </a:endParaRPr>
+          </a:p>
+          <a:p>
+            <a:pPr lvl="1"/>
+            <a:r>
+              <a:rPr lang="ru-RU" sz="1600" b="0" i="0" u="none" strike="noStrike" dirty="0">
+                <a:effectLst/>
+                <a:latin typeface="+mj-lt"/>
+              </a:rPr>
+              <a:t>Язык не предоставляет механизмов для автоматического управления памятью. Выделение и освобождение памяти для создаваемых объектов остаётся полностью на совести разработчика.</a:t>
+            </a:r>
+            <a:endParaRPr lang="ru-RU" sz="2100" b="0" i="0" u="none" strike="noStrike" dirty="0">
+              <a:effectLst/>
+              <a:latin typeface="+mj-lt"/>
+            </a:endParaRPr>
+          </a:p>
+          <a:p>
+            <a:pPr marL="0" indent="0">
+              <a:buNone/>
+            </a:pPr>
+            <a:br>
+              <a:rPr lang="en" sz="1050" dirty="0">
+                <a:latin typeface="+mj-lt"/>
+              </a:rPr>
+            </a:br>
+            <a:endParaRPr lang="ru-RU" sz="1200" dirty="0">
+              <a:latin typeface="+mj-lt"/>
+            </a:endParaRPr>
+          </a:p>
+          <a:p>
+            <a:pPr marL="457200" lvl="1" indent="0">
+              <a:buNone/>
+            </a:pPr>
+            <a:endParaRPr lang="ru-RU" sz="1200" dirty="0">
+              <a:latin typeface="+mj-lt"/>
+            </a:endParaRPr>
+          </a:p>
+          <a:p>
+            <a:pPr marL="457200" lvl="1" indent="0">
+              <a:buNone/>
+            </a:pPr>
+            <a:endParaRPr lang="ru-RU" sz="1200" dirty="0">
+              <a:latin typeface="+mj-lt"/>
+            </a:endParaRPr>
           </a:p>
         </p:txBody>
       </p:sp>
     </p:spTree>
     <p:extLst>
       <p:ext uri="{BB962C8B-B14F-4D97-AF65-F5344CB8AC3E}">
-        <p14:creationId xmlns:p14="http://schemas.microsoft.com/office/powerpoint/2010/main" val="3195558694"/>
+        <p14:creationId xmlns:p14="http://schemas.microsoft.com/office/powerpoint/2010/main" val="3475913054"/>
       </p:ext>
     </p:extLst>
   </p:cSld>
@@ -3904,7 +5400,7 @@
           <p:cNvPr id="2" name="Заголовок 1">
             <a:extLst>
               <a:ext uri="{FF2B5EF4-FFF2-40B4-BE49-F238E27FC236}">
-                <a16:creationId xmlns:a16="http://schemas.microsoft.com/office/drawing/2014/main" id="{CE3DFBBE-1258-16F5-7626-4B53EFC6C005}"/>
+                <a16:creationId xmlns:a16="http://schemas.microsoft.com/office/drawing/2014/main" id="{6FF5EB0D-BD4B-D209-53BB-29ACE81D04AB}"/>
               </a:ext>
             </a:extLst>
           </p:cNvPr>
@@ -3921,20 +5417,28 @@
           <a:lstStyle/>
           <a:p>
             <a:r>
-              <a:rPr lang="en" sz="4400" b="0" i="0" u="none" strike="noStrike" dirty="0">
+              <a:rPr lang="ru-RU" dirty="0">
                 <a:solidFill>
                   <a:srgbClr val="FFFF00"/>
                 </a:solidFill>
-                <a:effectLst/>
-                <a:latin typeface="+mj-lt"/>
-              </a:rPr>
-              <a:t>Weak, Strong, Unowned</a:t>
-            </a:r>
-            <a:endParaRPr lang="ru-RU" dirty="0">
-              <a:solidFill>
-                <a:srgbClr val="FFFF00"/>
-              </a:solidFill>
-            </a:endParaRPr>
+              </a:rPr>
+              <a:t>Управление памятью в современных ЯП</a:t>
+            </a:r>
+            <a:br>
+              <a:rPr lang="ru-RU" dirty="0">
+                <a:solidFill>
+                  <a:srgbClr val="FFFF00"/>
+                </a:solidFill>
+              </a:rPr>
+            </a:br>
+            <a:r>
+              <a:rPr lang="ru-RU" sz="2500" dirty="0">
+                <a:solidFill>
+                  <a:srgbClr val="FFFF00"/>
+                </a:solidFill>
+              </a:rPr>
+              <a:t>(Подходы к управлению памятью)</a:t>
+            </a:r>
           </a:p>
         </p:txBody>
       </p:sp>
@@ -3943,7 +5447,7 @@
           <p:cNvPr id="3" name="Объект 2">
             <a:extLst>
               <a:ext uri="{FF2B5EF4-FFF2-40B4-BE49-F238E27FC236}">
-                <a16:creationId xmlns:a16="http://schemas.microsoft.com/office/drawing/2014/main" id="{67F42960-E25D-9581-2755-04035EE0E74F}"/>
+                <a16:creationId xmlns:a16="http://schemas.microsoft.com/office/drawing/2014/main" id="{B609F2BD-30CD-6C15-FED6-F0E01845923D}"/>
               </a:ext>
             </a:extLst>
           </p:cNvPr>
@@ -3956,17 +5460,155 @@
         </p:nvSpPr>
         <p:spPr/>
         <p:txBody>
-          <a:bodyPr/>
-          <a:lstStyle/>
-          <a:p>
-            <a:endParaRPr lang="ru-RU"/>
+          <a:bodyPr>
+            <a:normAutofit lnSpcReduction="10000"/>
+          </a:bodyPr>
+          <a:lstStyle/>
+          <a:p>
+            <a:pPr algn="l">
+              <a:buFont typeface="Arial" panose="020B0604020202020204" pitchFamily="34" charset="0"/>
+              <a:buChar char="•"/>
+            </a:pPr>
+            <a:r>
+              <a:rPr lang="ru-RU" sz="2500" b="0" i="0" u="none" strike="noStrike" dirty="0">
+                <a:effectLst/>
+                <a:latin typeface="+mj-lt"/>
+              </a:rPr>
+              <a:t>Сборщик мусора</a:t>
+            </a:r>
+          </a:p>
+          <a:p>
+            <a:pPr lvl="1"/>
+            <a:r>
+              <a:rPr lang="ru-RU" sz="1600" b="0" i="0" u="none" strike="noStrike" dirty="0">
+                <a:effectLst/>
+                <a:latin typeface="+mj-lt"/>
+              </a:rPr>
+              <a:t>Сборка мусора — это процесс автоматического управления памятью в куче, который заключается в поиске </a:t>
+            </a:r>
+            <a:r>
+              <a:rPr lang="ru-RU" sz="1600" b="0" i="0" u="none" strike="noStrike" dirty="0" err="1">
+                <a:effectLst/>
+                <a:latin typeface="+mj-lt"/>
+              </a:rPr>
+              <a:t>неиспользующихся</a:t>
+            </a:r>
+            <a:r>
+              <a:rPr lang="ru-RU" sz="1600" b="0" i="0" u="none" strike="noStrike" dirty="0">
+                <a:effectLst/>
+                <a:latin typeface="+mj-lt"/>
+              </a:rPr>
+              <a:t> участков памяти, которые ранее были заняты под нужды программы. Это один из наиболее популярных вариантов механизма для управления памятью в современных языках программирования. Подпрограмма сборки мусора обычно запускается в заранее определённые интервалы времени и бывает, что её запуск совпадает с </a:t>
+            </a:r>
+            <a:r>
+              <a:rPr lang="ru-RU" sz="1600" b="0" i="0" u="none" strike="noStrike" dirty="0" err="1">
+                <a:effectLst/>
+                <a:latin typeface="+mj-lt"/>
+              </a:rPr>
+              <a:t>ресурсозатратными</a:t>
+            </a:r>
+            <a:r>
+              <a:rPr lang="ru-RU" sz="1600" b="0" i="0" u="none" strike="noStrike" dirty="0">
+                <a:effectLst/>
+                <a:latin typeface="+mj-lt"/>
+              </a:rPr>
+              <a:t> процессами, в результате чего происходит задержка в работе приложения.</a:t>
+            </a:r>
+            <a:endParaRPr lang="ru-RU" sz="2100" b="0" i="0" u="none" strike="noStrike" dirty="0">
+              <a:effectLst/>
+              <a:latin typeface="+mj-lt"/>
+            </a:endParaRPr>
+          </a:p>
+          <a:p>
+            <a:pPr lvl="1"/>
+            <a:r>
+              <a:rPr lang="ru-RU" sz="2100" b="0" i="0" u="none" strike="noStrike" dirty="0">
+                <a:effectLst/>
+                <a:latin typeface="+mj-lt"/>
+              </a:rPr>
+              <a:t>Сборщик мусора на основе алгоритма пометок </a:t>
+            </a:r>
+            <a:r>
+              <a:rPr lang="en" sz="2100" i="0" u="none" strike="noStrike" dirty="0">
+                <a:effectLst/>
+                <a:latin typeface="+mj-lt"/>
+              </a:rPr>
+              <a:t>(Mark &amp; Sweep) </a:t>
+            </a:r>
+            <a:endParaRPr lang="ru-RU" sz="2100" i="0" u="none" strike="noStrike" dirty="0">
+              <a:effectLst/>
+              <a:latin typeface="+mj-lt"/>
+            </a:endParaRPr>
+          </a:p>
+          <a:p>
+            <a:pPr lvl="2"/>
+            <a:r>
+              <a:rPr lang="ru-RU" sz="1600" b="0" i="0" u="none" strike="noStrike" dirty="0">
+                <a:effectLst/>
+                <a:latin typeface="+mj-lt"/>
+              </a:rPr>
+              <a:t>Это алгоритм, работа которого происходит в две фазы: первым делом он помечает объекты в памяти, на которые имеются ссылки, а затем освобождает память от объектов, которые пометки не получили.</a:t>
+            </a:r>
+            <a:endParaRPr lang="ru-RU" sz="1600" i="0" u="none" strike="noStrike" dirty="0">
+              <a:effectLst/>
+              <a:latin typeface="+mj-lt"/>
+            </a:endParaRPr>
+          </a:p>
+          <a:p>
+            <a:pPr lvl="1"/>
+            <a:r>
+              <a:rPr lang="ru-RU" sz="2100" b="0" i="0" u="none" strike="noStrike" dirty="0">
+                <a:effectLst/>
+                <a:latin typeface="+mj-lt"/>
+              </a:rPr>
+              <a:t>Сборщик мусора с подсчётом ссылок</a:t>
+            </a:r>
+          </a:p>
+          <a:p>
+            <a:pPr lvl="2"/>
+            <a:r>
+              <a:rPr lang="ru-RU" sz="1600" b="0" i="0" u="none" strike="noStrike" dirty="0">
+                <a:effectLst/>
+                <a:latin typeface="+mj-lt"/>
+              </a:rPr>
+              <a:t>Для каждого объекта в куче ведётся счётчик ссылок на него — если счётчик достигает нуля, то память высвобождается. Данный алгоритм в чистом виде не способен корректно обрабатывать циклические ссылки объекта на самого себя. Сборщик мусора с подсчётом ссылок, вместе с дополнительными ухищрениями для выявления и обработки циклических ссылок</a:t>
+            </a:r>
+          </a:p>
+          <a:p>
+            <a:pPr marL="0" indent="0">
+              <a:buNone/>
+            </a:pPr>
+            <a:br>
+              <a:rPr lang="en" sz="1050" dirty="0">
+                <a:latin typeface="+mj-lt"/>
+              </a:rPr>
+            </a:br>
+            <a:endParaRPr lang="ru-RU" sz="1200" dirty="0">
+              <a:latin typeface="+mj-lt"/>
+            </a:endParaRPr>
+          </a:p>
+          <a:p>
+            <a:pPr marL="457200" lvl="1" indent="0">
+              <a:buNone/>
+            </a:pPr>
+            <a:endParaRPr lang="ru-RU" sz="1200" dirty="0">
+              <a:latin typeface="+mj-lt"/>
+            </a:endParaRPr>
+          </a:p>
+          <a:p>
+            <a:pPr marL="457200" lvl="1" indent="0">
+              <a:buNone/>
+            </a:pPr>
+            <a:endParaRPr lang="ru-RU" sz="1200" dirty="0">
+              <a:latin typeface="+mj-lt"/>
+            </a:endParaRPr>
           </a:p>
         </p:txBody>
       </p:sp>
     </p:spTree>
     <p:extLst>
       <p:ext uri="{BB962C8B-B14F-4D97-AF65-F5344CB8AC3E}">
-        <p14:creationId xmlns:p14="http://schemas.microsoft.com/office/powerpoint/2010/main" val="1821829135"/>
+        <p14:creationId xmlns:p14="http://schemas.microsoft.com/office/powerpoint/2010/main" val="1843750986"/>
       </p:ext>
     </p:extLst>
   </p:cSld>
@@ -3998,7 +5640,7 @@
           <p:cNvPr id="2" name="Заголовок 1">
             <a:extLst>
               <a:ext uri="{FF2B5EF4-FFF2-40B4-BE49-F238E27FC236}">
-                <a16:creationId xmlns:a16="http://schemas.microsoft.com/office/drawing/2014/main" id="{F5E9D4A7-63AE-768B-E967-B61C4BF93EED}"/>
+                <a16:creationId xmlns:a16="http://schemas.microsoft.com/office/drawing/2014/main" id="{6FF5EB0D-BD4B-D209-53BB-29ACE81D04AB}"/>
               </a:ext>
             </a:extLst>
           </p:cNvPr>
@@ -4015,20 +5657,28 @@
           <a:lstStyle/>
           <a:p>
             <a:r>
-              <a:rPr lang="en" sz="4400" b="0" i="0" u="none" strike="noStrike" dirty="0">
+              <a:rPr lang="ru-RU" dirty="0">
                 <a:solidFill>
                   <a:srgbClr val="FFFF00"/>
                 </a:solidFill>
-                <a:effectLst/>
-                <a:latin typeface="+mj-lt"/>
-              </a:rPr>
-              <a:t>Swift Object Lifecycle</a:t>
-            </a:r>
-            <a:endParaRPr lang="ru-RU" dirty="0">
-              <a:solidFill>
-                <a:srgbClr val="FFFF00"/>
-              </a:solidFill>
-            </a:endParaRPr>
+              </a:rPr>
+              <a:t>Управление памятью в современных ЯП</a:t>
+            </a:r>
+            <a:br>
+              <a:rPr lang="ru-RU" dirty="0">
+                <a:solidFill>
+                  <a:srgbClr val="FFFF00"/>
+                </a:solidFill>
+              </a:rPr>
+            </a:br>
+            <a:r>
+              <a:rPr lang="ru-RU" sz="2500" dirty="0">
+                <a:solidFill>
+                  <a:srgbClr val="FFFF00"/>
+                </a:solidFill>
+              </a:rPr>
+              <a:t>(Подходы к управлению памятью)</a:t>
+            </a:r>
           </a:p>
         </p:txBody>
       </p:sp>
@@ -4037,7 +5687,7 @@
           <p:cNvPr id="3" name="Объект 2">
             <a:extLst>
               <a:ext uri="{FF2B5EF4-FFF2-40B4-BE49-F238E27FC236}">
-                <a16:creationId xmlns:a16="http://schemas.microsoft.com/office/drawing/2014/main" id="{A46B9563-6FD4-C902-6EB5-7969E07F2C9C}"/>
+                <a16:creationId xmlns:a16="http://schemas.microsoft.com/office/drawing/2014/main" id="{B609F2BD-30CD-6C15-FED6-F0E01845923D}"/>
               </a:ext>
             </a:extLst>
           </p:cNvPr>
@@ -4050,17 +5700,89 @@
         </p:nvSpPr>
         <p:spPr/>
         <p:txBody>
-          <a:bodyPr/>
-          <a:lstStyle/>
-          <a:p>
-            <a:endParaRPr lang="ru-RU"/>
+          <a:bodyPr>
+            <a:normAutofit/>
+          </a:bodyPr>
+          <a:lstStyle/>
+          <a:p>
+            <a:pPr algn="l">
+              <a:buFont typeface="Arial" panose="020B0604020202020204" pitchFamily="34" charset="0"/>
+              <a:buChar char="•"/>
+            </a:pPr>
+            <a:r>
+              <a:rPr lang="ru-RU" sz="2500" b="0" i="0" u="none" strike="noStrike" dirty="0">
+                <a:effectLst/>
+                <a:latin typeface="+mj-lt"/>
+              </a:rPr>
+              <a:t>Автоматический подсчёт ссылок (</a:t>
+            </a:r>
+            <a:r>
+              <a:rPr lang="en" sz="2500" b="0" i="0" u="none" strike="noStrike" dirty="0">
+                <a:effectLst/>
+                <a:latin typeface="+mj-lt"/>
+              </a:rPr>
+              <a:t>ARC</a:t>
+            </a:r>
+            <a:r>
+              <a:rPr lang="ru-RU" sz="2500" dirty="0">
+                <a:latin typeface="+mj-lt"/>
+              </a:rPr>
+              <a:t>)</a:t>
+            </a:r>
+          </a:p>
+          <a:p>
+            <a:pPr lvl="1"/>
+            <a:r>
+              <a:rPr lang="ru-RU" sz="1500" b="0" i="0" u="none" strike="noStrike" dirty="0">
+                <a:effectLst/>
+                <a:latin typeface="+mj-lt"/>
+              </a:rPr>
+              <a:t>Данный подход весьма похож на сборку мусора с подсчётом ссылок, однако, вместо запуска процесса подсчёта в определённые интервалы времени, инструкции выделения и освобождения памяти вставляются на этапе компиляции прямо в байт-код. Когда же счётчик ссылок достигает нуля, память освобождается как часть нормального потока выполнения программы.</a:t>
+            </a:r>
+          </a:p>
+          <a:p>
+            <a:pPr lvl="1"/>
+            <a:r>
+              <a:rPr lang="ru-RU" sz="1500" b="0" i="0" u="none" strike="noStrike" dirty="0">
+                <a:effectLst/>
+                <a:latin typeface="+mj-lt"/>
+              </a:rPr>
+              <a:t>Автоматический подсчёт ссылок всё так же не позволяет обрабатывать циклические ссылки и требует от разработчика использования специальных ключевых слов для дополнительной обработки таких ситуаций.</a:t>
+            </a:r>
+          </a:p>
+          <a:p>
+            <a:pPr lvl="1"/>
+            <a:br>
+              <a:rPr lang="en" sz="100" dirty="0">
+                <a:latin typeface="+mj-lt"/>
+              </a:rPr>
+            </a:br>
+            <a:endParaRPr lang="ru-RU" sz="100" dirty="0">
+              <a:latin typeface="+mj-lt"/>
+            </a:endParaRPr>
+          </a:p>
+          <a:p>
+            <a:pPr marL="457200" lvl="1" indent="0">
+              <a:buNone/>
+            </a:pPr>
+            <a:endParaRPr lang="ru-RU" sz="1200" dirty="0">
+              <a:latin typeface="+mj-lt"/>
+            </a:endParaRPr>
+          </a:p>
+          <a:p>
+            <a:pPr marL="457200" lvl="1" indent="0">
+              <a:buNone/>
+            </a:pPr>
+            <a:endParaRPr lang="ru-RU" sz="1200" dirty="0">
+              <a:latin typeface="+mj-lt"/>
+            </a:endParaRPr>
           </a:p>
         </p:txBody>
       </p:sp>
     </p:spTree>
     <p:extLst>
       <p:ext uri="{BB962C8B-B14F-4D97-AF65-F5344CB8AC3E}">
-        <p14:creationId xmlns:p14="http://schemas.microsoft.com/office/powerpoint/2010/main" val="375712703"/>
+        <p14:creationId xmlns:p14="http://schemas.microsoft.com/office/powerpoint/2010/main" val="3639346961"/>
       </p:ext>
     </p:extLst>
   </p:cSld>
@@ -4092,7 +5814,7 @@
           <p:cNvPr id="2" name="Заголовок 1">
             <a:extLst>
               <a:ext uri="{FF2B5EF4-FFF2-40B4-BE49-F238E27FC236}">
-                <a16:creationId xmlns:a16="http://schemas.microsoft.com/office/drawing/2014/main" id="{8143DB06-FF76-D5EF-190C-D602489B68FA}"/>
+                <a16:creationId xmlns:a16="http://schemas.microsoft.com/office/drawing/2014/main" id="{15C7B1D4-EDCE-0203-C500-1206B27EDB63}"/>
               </a:ext>
             </a:extLst>
           </p:cNvPr>
@@ -4109,20 +5831,45 @@
           <a:lstStyle/>
           <a:p>
             <a:r>
-              <a:rPr lang="en" sz="4400" b="0" i="0" u="none" strike="noStrike" dirty="0" err="1">
+              <a:rPr lang="ru-RU" dirty="0">
                 <a:solidFill>
                   <a:srgbClr val="FFFF00"/>
                 </a:solidFill>
-                <a:effectLst/>
-                <a:latin typeface="+mj-lt"/>
-              </a:rPr>
-              <a:t>Autoreleasepool</a:t>
-            </a:r>
-            <a:endParaRPr lang="ru-RU" dirty="0">
-              <a:solidFill>
-                <a:srgbClr val="FFFF00"/>
-              </a:solidFill>
-            </a:endParaRPr>
+              </a:rPr>
+              <a:t>Управление памятью в современных ЯП</a:t>
+            </a:r>
+            <a:br>
+              <a:rPr lang="ru-RU" dirty="0">
+                <a:solidFill>
+                  <a:srgbClr val="FFFF00"/>
+                </a:solidFill>
+              </a:rPr>
+            </a:br>
+            <a:r>
+              <a:rPr lang="ru-RU" sz="2500" dirty="0">
+                <a:solidFill>
+                  <a:srgbClr val="FFFF00"/>
+                </a:solidFill>
+              </a:rPr>
+              <a:t>(Концепция </a:t>
+            </a:r>
+            <a:r>
+              <a:rPr lang="en-US" sz="2500" dirty="0">
+                <a:solidFill>
+                  <a:srgbClr val="FFFF00"/>
+                </a:solidFill>
+              </a:rPr>
+              <a:t>Ownership</a:t>
+            </a:r>
+            <a:r>
+              <a:rPr lang="ru-RU" sz="2500" dirty="0">
+                <a:solidFill>
+                  <a:srgbClr val="FFFF00"/>
+                </a:solidFill>
+              </a:rPr>
+              <a:t>)</a:t>
+            </a:r>
+            <a:endParaRPr lang="ru-RU" dirty="0"/>
           </a:p>
         </p:txBody>
       </p:sp>
@@ -4131,7 +5878,7 @@
           <p:cNvPr id="3" name="Объект 2">
             <a:extLst>
               <a:ext uri="{FF2B5EF4-FFF2-40B4-BE49-F238E27FC236}">
-                <a16:creationId xmlns:a16="http://schemas.microsoft.com/office/drawing/2014/main" id="{00E6139E-DC44-1D2A-58F1-FD53E2EA434C}"/>
+                <a16:creationId xmlns:a16="http://schemas.microsoft.com/office/drawing/2014/main" id="{372D352F-9389-5675-B04D-DEC8EFFE5FE2}"/>
               </a:ext>
             </a:extLst>
           </p:cNvPr>
@@ -4144,17 +5891,110 @@
         </p:nvSpPr>
         <p:spPr/>
         <p:txBody>
-          <a:bodyPr/>
-          <a:lstStyle/>
-          <a:p>
-            <a:endParaRPr lang="ru-RU"/>
+          <a:bodyPr>
+            <a:normAutofit/>
+          </a:bodyPr>
+          <a:lstStyle/>
+          <a:p>
+            <a:r>
+              <a:rPr lang="en-US" sz="2500" dirty="0">
+                <a:latin typeface="+mj-lt"/>
+              </a:rPr>
+              <a:t>Ownership – </a:t>
+            </a:r>
+            <a:r>
+              <a:rPr lang="ru-RU" sz="2500" dirty="0">
+                <a:latin typeface="+mj-lt"/>
+              </a:rPr>
+              <a:t>право собственности</a:t>
+            </a:r>
+          </a:p>
+          <a:p>
+            <a:r>
+              <a:rPr lang="ru-RU" sz="2500" dirty="0">
+                <a:latin typeface="+mj-lt"/>
+              </a:rPr>
+              <a:t>О</a:t>
+            </a:r>
+            <a:r>
+              <a:rPr lang="ru-RU" sz="2500" b="0" i="0" u="none" strike="noStrike" dirty="0">
+                <a:effectLst/>
+                <a:latin typeface="+mj-lt"/>
+              </a:rPr>
+              <a:t>сновные идеи этой концепции:</a:t>
+            </a:r>
+          </a:p>
+          <a:p>
+            <a:pPr lvl="1"/>
+            <a:r>
+              <a:rPr lang="ru-RU" sz="1500" b="0" i="0" u="none" strike="noStrike" dirty="0">
+                <a:effectLst/>
+                <a:latin typeface="+mj-lt"/>
+              </a:rPr>
+              <a:t>Каждое значение в памяти должно иметь только одну переменную-владельца</a:t>
+            </a:r>
+          </a:p>
+          <a:p>
+            <a:pPr lvl="1"/>
+            <a:r>
+              <a:rPr lang="ru-RU" sz="1500" b="0" i="0" u="none" strike="noStrike" dirty="0">
+                <a:effectLst/>
+                <a:latin typeface="+mj-lt"/>
+              </a:rPr>
+              <a:t>Когда владелец уходит из области выполнения, память сразу же освобождается. (Можно сказать, что это примерно как подсчёт ссылок на этапе компиляции).</a:t>
+            </a:r>
+          </a:p>
+          <a:p>
+            <a:pPr lvl="1"/>
+            <a:r>
+              <a:rPr lang="ru-RU" sz="1500" b="0" i="0" u="none" strike="noStrike" dirty="0">
+                <a:effectLst/>
+                <a:latin typeface="+mj-lt"/>
+              </a:rPr>
+              <a:t>Каждая часть кода несет ответственность за то, чтобы в конечном итоге вызвать уничтожение объекта</a:t>
+            </a:r>
+          </a:p>
+          <a:p>
+            <a:r>
+              <a:rPr lang="ru-RU" sz="2500" b="0" i="0" u="none" strike="noStrike" dirty="0">
+                <a:effectLst/>
+                <a:latin typeface="+mj-lt"/>
+              </a:rPr>
+              <a:t>В некоторых языках она </a:t>
+            </a:r>
+            <a:r>
+              <a:rPr lang="ru-RU" sz="2500" dirty="0">
+                <a:latin typeface="+mj-lt"/>
+              </a:rPr>
+              <a:t>явно контролируется программистами, в некоторых частично, в </a:t>
+            </a:r>
+            <a:r>
+              <a:rPr lang="en" sz="2500" b="0" i="0" u="none" strike="noStrike" dirty="0">
+                <a:effectLst/>
+                <a:latin typeface="+mj-lt"/>
+              </a:rPr>
+              <a:t>Swift </a:t>
+            </a:r>
+            <a:r>
+              <a:rPr lang="ru-RU" sz="2500" b="0" i="0" u="none" strike="noStrike" dirty="0">
+                <a:effectLst/>
+                <a:latin typeface="+mj-lt"/>
+              </a:rPr>
+              <a:t>уже есть система владения, но она «под прикрытием»: это деталь реализации, на которую программисты не могут повлиять</a:t>
+            </a:r>
+          </a:p>
+          <a:p>
+            <a:pPr lvl="1"/>
+            <a:endParaRPr lang="ru-RU" sz="2100" dirty="0">
+              <a:latin typeface="+mj-lt"/>
+            </a:endParaRPr>
           </a:p>
         </p:txBody>
       </p:sp>
     </p:spTree>
     <p:extLst>
       <p:ext uri="{BB962C8B-B14F-4D97-AF65-F5344CB8AC3E}">
-        <p14:creationId xmlns:p14="http://schemas.microsoft.com/office/powerpoint/2010/main" val="3200227656"/>
+        <p14:creationId xmlns:p14="http://schemas.microsoft.com/office/powerpoint/2010/main" val="3101857481"/>
       </p:ext>
     </p:extLst>
   </p:cSld>

</xml_diff>

<commit_message>
Some changes with themes
</commit_message>
<xml_diff>
--- a/1st-presentation/Abrosov-1st-presentation.pptx
+++ b/1st-presentation/Abrosov-1st-presentation.pptx
@@ -4036,7 +4036,42 @@
           <a:bodyPr/>
           <a:lstStyle/>
           <a:p>
-            <a:endParaRPr lang="ru-RU" dirty="0"/>
+            <a:r>
+              <a:rPr lang="ru-RU" dirty="0"/>
+              <a:t>Если создать </a:t>
+            </a:r>
+            <a:r>
+              <a:rPr lang="en-US" dirty="0"/>
+              <a:t>value type </a:t>
+            </a:r>
+            <a:r>
+              <a:rPr lang="ru-RU" dirty="0"/>
+              <a:t>переменную и передать ее внутрь функции, то она будет обозначена внутри </a:t>
+            </a:r>
+            <a:r>
+              <a:rPr lang="ru-RU" dirty="0" err="1"/>
+              <a:t>фукнции</a:t>
+            </a:r>
+            <a:r>
+              <a:rPr lang="ru-RU" dirty="0"/>
+              <a:t> как </a:t>
+            </a:r>
+            <a:r>
+              <a:rPr lang="en-US" dirty="0"/>
+              <a:t>let </a:t>
+            </a:r>
+            <a:r>
+              <a:rPr lang="ru-RU" dirty="0"/>
+              <a:t>или как </a:t>
+            </a:r>
+            <a:r>
+              <a:rPr lang="en-US" dirty="0"/>
+              <a:t>var, </a:t>
+            </a:r>
+            <a:r>
+              <a:rPr lang="ru-RU" dirty="0"/>
+              <a:t>это будет новая переменная со своим собственным адресом в памяти или нет?</a:t>
+            </a:r>
           </a:p>
         </p:txBody>
       </p:sp>

</xml_diff>